<commit_message>
Setting up shop for summer 2025
</commit_message>
<xml_diff>
--- a/Lecture Slides/COACH A01 - Introduction.pptx
+++ b/Lecture Slides/COACH A01 - Introduction.pptx
@@ -25,6 +25,8 @@
     <p:sldId id="270" r:id="rId21"/>
     <p:sldId id="271" r:id="rId22"/>
     <p:sldId id="272" r:id="rId23"/>
+    <p:sldId id="273" r:id="rId24"/>
+    <p:sldId id="274" r:id="rId25"/>
   </p:sldIdLst>
   <p:sldSz cy="5143500" cx="9144000"/>
   <p:notesSz cx="6858000" cy="9144000"/>
@@ -820,7 +822,7 @@
       </p:grpSpPr>
       <p:sp>
         <p:nvSpPr>
-          <p:cNvPr id="96" name="Google Shape;96;gf157d98dbb_0_133:notes"/>
+          <p:cNvPr id="96" name="Google Shape;96;g2a4cd9d8361_0_0:notes"/>
           <p:cNvSpPr/>
           <p:nvPr>
             <p:ph idx="2" type="sldImg"/>
@@ -855,7 +857,7 @@
       </p:sp>
       <p:sp>
         <p:nvSpPr>
-          <p:cNvPr id="97" name="Google Shape;97;gf157d98dbb_0_133:notes"/>
+          <p:cNvPr id="97" name="Google Shape;97;g2a4cd9d8361_0_0:notes"/>
           <p:cNvSpPr txBox="1"/>
           <p:nvPr>
             <p:ph idx="1" type="body"/>
@@ -905,7 +907,7 @@
   <p:cSld>
     <p:spTree>
       <p:nvGrpSpPr>
-        <p:cNvPr id="103" name="Shape 103"/>
+        <p:cNvPr id="102" name="Shape 102"/>
         <p:cNvGrpSpPr/>
         <p:nvPr/>
       </p:nvGrpSpPr>
@@ -919,7 +921,7 @@
       </p:grpSpPr>
       <p:sp>
         <p:nvSpPr>
-          <p:cNvPr id="104" name="Google Shape;104;gf157d98dbb_1_0:notes"/>
+          <p:cNvPr id="103" name="Google Shape;103;gdb5ccdfa64_0_0:notes"/>
           <p:cNvSpPr/>
           <p:nvPr>
             <p:ph idx="2" type="sldImg"/>
@@ -954,7 +956,7 @@
       </p:sp>
       <p:sp>
         <p:nvSpPr>
-          <p:cNvPr id="105" name="Google Shape;105;gf157d98dbb_1_0:notes"/>
+          <p:cNvPr id="104" name="Google Shape;104;gdb5ccdfa64_0_0:notes"/>
           <p:cNvSpPr txBox="1"/>
           <p:nvPr>
             <p:ph idx="1" type="body"/>
@@ -1004,7 +1006,7 @@
   <p:cSld>
     <p:spTree>
       <p:nvGrpSpPr>
-        <p:cNvPr id="110" name="Shape 110"/>
+        <p:cNvPr id="109" name="Shape 109"/>
         <p:cNvGrpSpPr/>
         <p:nvPr/>
       </p:nvGrpSpPr>
@@ -1018,7 +1020,7 @@
       </p:grpSpPr>
       <p:sp>
         <p:nvSpPr>
-          <p:cNvPr id="111" name="Google Shape;111;gf157d98dbb_1_7:notes"/>
+          <p:cNvPr id="110" name="Google Shape;110;gf157d98dbb_0_133:notes"/>
           <p:cNvSpPr/>
           <p:nvPr>
             <p:ph idx="2" type="sldImg"/>
@@ -1053,7 +1055,7 @@
       </p:sp>
       <p:sp>
         <p:nvSpPr>
-          <p:cNvPr id="112" name="Google Shape;112;gf157d98dbb_1_7:notes"/>
+          <p:cNvPr id="111" name="Google Shape;111;gf157d98dbb_0_133:notes"/>
           <p:cNvSpPr txBox="1"/>
           <p:nvPr>
             <p:ph idx="1" type="body"/>
@@ -1117,7 +1119,7 @@
       </p:grpSpPr>
       <p:sp>
         <p:nvSpPr>
-          <p:cNvPr id="118" name="Google Shape;118;gf157d98dbb_1_14:notes"/>
+          <p:cNvPr id="118" name="Google Shape;118;gf157d98dbb_1_0:notes"/>
           <p:cNvSpPr/>
           <p:nvPr>
             <p:ph idx="2" type="sldImg"/>
@@ -1152,7 +1154,7 @@
       </p:sp>
       <p:sp>
         <p:nvSpPr>
-          <p:cNvPr id="119" name="Google Shape;119;gf157d98dbb_1_14:notes"/>
+          <p:cNvPr id="119" name="Google Shape;119;gf157d98dbb_1_0:notes"/>
           <p:cNvSpPr txBox="1"/>
           <p:nvPr>
             <p:ph idx="1" type="body"/>
@@ -1216,7 +1218,7 @@
       </p:grpSpPr>
       <p:sp>
         <p:nvSpPr>
-          <p:cNvPr id="125" name="Google Shape;125;gf157d98dbb_1_20:notes"/>
+          <p:cNvPr id="125" name="Google Shape;125;gf157d98dbb_1_7:notes"/>
           <p:cNvSpPr/>
           <p:nvPr>
             <p:ph idx="2" type="sldImg"/>
@@ -1251,7 +1253,7 @@
       </p:sp>
       <p:sp>
         <p:nvSpPr>
-          <p:cNvPr id="126" name="Google Shape;126;gf157d98dbb_1_20:notes"/>
+          <p:cNvPr id="126" name="Google Shape;126;gf157d98dbb_1_7:notes"/>
           <p:cNvSpPr txBox="1"/>
           <p:nvPr>
             <p:ph idx="1" type="body"/>
@@ -1315,7 +1317,7 @@
       </p:grpSpPr>
       <p:sp>
         <p:nvSpPr>
-          <p:cNvPr id="132" name="Google Shape;132;gf157d98dbb_1_32:notes"/>
+          <p:cNvPr id="132" name="Google Shape;132;gf157d98dbb_1_14:notes"/>
           <p:cNvSpPr/>
           <p:nvPr>
             <p:ph idx="2" type="sldImg"/>
@@ -1350,7 +1352,7 @@
       </p:sp>
       <p:sp>
         <p:nvSpPr>
-          <p:cNvPr id="133" name="Google Shape;133;gf157d98dbb_1_32:notes"/>
+          <p:cNvPr id="133" name="Google Shape;133;gf157d98dbb_1_14:notes"/>
           <p:cNvSpPr txBox="1"/>
           <p:nvPr>
             <p:ph idx="1" type="body"/>
@@ -1414,7 +1416,7 @@
       </p:grpSpPr>
       <p:sp>
         <p:nvSpPr>
-          <p:cNvPr id="139" name="Google Shape;139;gf157d98db7_0_0:notes"/>
+          <p:cNvPr id="139" name="Google Shape;139;gf157d98dbb_1_20:notes"/>
           <p:cNvSpPr/>
           <p:nvPr>
             <p:ph idx="2" type="sldImg"/>
@@ -1449,7 +1451,7 @@
       </p:sp>
       <p:sp>
         <p:nvSpPr>
-          <p:cNvPr id="140" name="Google Shape;140;gf157d98db7_0_0:notes"/>
+          <p:cNvPr id="140" name="Google Shape;140;gf157d98dbb_1_20:notes"/>
           <p:cNvSpPr txBox="1"/>
           <p:nvPr>
             <p:ph idx="1" type="body"/>
@@ -1499,7 +1501,7 @@
   <p:cSld>
     <p:spTree>
       <p:nvGrpSpPr>
-        <p:cNvPr id="144" name="Shape 144"/>
+        <p:cNvPr id="145" name="Shape 145"/>
         <p:cNvGrpSpPr/>
         <p:nvPr/>
       </p:nvGrpSpPr>
@@ -1513,7 +1515,7 @@
       </p:grpSpPr>
       <p:sp>
         <p:nvSpPr>
-          <p:cNvPr id="145" name="Google Shape;145;gf157d98db7_0_5:notes"/>
+          <p:cNvPr id="146" name="Google Shape;146;gf157d98dbb_1_32:notes"/>
           <p:cNvSpPr/>
           <p:nvPr>
             <p:ph idx="2" type="sldImg"/>
@@ -1548,7 +1550,205 @@
       </p:sp>
       <p:sp>
         <p:nvSpPr>
-          <p:cNvPr id="146" name="Google Shape;146;gf157d98db7_0_5:notes"/>
+          <p:cNvPr id="147" name="Google Shape;147;gf157d98dbb_1_32:notes"/>
+          <p:cNvSpPr txBox="1"/>
+          <p:nvPr>
+            <p:ph idx="1" type="body"/>
+          </p:nvPr>
+        </p:nvSpPr>
+        <p:spPr>
+          <a:xfrm>
+            <a:off x="685800" y="4343400"/>
+            <a:ext cx="5486400" cy="4114800"/>
+          </a:xfrm>
+          <a:prstGeom prst="rect">
+            <a:avLst/>
+          </a:prstGeom>
+        </p:spPr>
+        <p:txBody>
+          <a:bodyPr anchorCtr="0" anchor="t" bIns="91425" lIns="91425" spcFirstLastPara="1" rIns="91425" wrap="square" tIns="91425">
+            <a:noAutofit/>
+          </a:bodyPr>
+          <a:lstStyle/>
+          <a:p>
+            <a:pPr indent="0" lvl="0" marL="0" rtl="0" algn="l">
+              <a:spcBef>
+                <a:spcPts val="0"/>
+              </a:spcBef>
+              <a:spcAft>
+                <a:spcPts val="0"/>
+              </a:spcAft>
+              <a:buNone/>
+            </a:pPr>
+            <a:r>
+              <a:t/>
+            </a:r>
+            <a:endParaRPr/>
+          </a:p>
+        </p:txBody>
+      </p:sp>
+    </p:spTree>
+  </p:cSld>
+  <p:clrMapOvr>
+    <a:masterClrMapping/>
+  </p:clrMapOvr>
+</p:notes>
+</file>
+
+<file path=ppt/notesSlides/notesSlide18.xml><?xml version="1.0" encoding="utf-8"?>
+<p:notes xmlns:a="http://schemas.openxmlformats.org/drawingml/2006/main" xmlns:r="http://schemas.openxmlformats.org/officeDocument/2006/relationships" xmlns:mc="http://schemas.openxmlformats.org/markup-compatibility/2006" xmlns:mv="urn:schemas-microsoft-com:mac:vml" xmlns:p="http://schemas.openxmlformats.org/presentationml/2006/main" xmlns:c="http://schemas.openxmlformats.org/drawingml/2006/chart" xmlns:dgm="http://schemas.openxmlformats.org/drawingml/2006/diagram" xmlns:o="urn:schemas-microsoft-com:office:office" xmlns:v="urn:schemas-microsoft-com:vml" xmlns:pvml="urn:schemas-microsoft-com:office:powerpoint" xmlns:com="http://schemas.openxmlformats.org/drawingml/2006/compatibility" xmlns:p14="http://schemas.microsoft.com/office/powerpoint/2010/main" xmlns:p15="http://schemas.microsoft.com/office/powerpoint/2012/main" xmlns:ahyp="http://schemas.microsoft.com/office/drawing/2018/hyperlinkcolor" showMasterPhAnim="0" showMasterSp="0">
+  <p:cSld>
+    <p:spTree>
+      <p:nvGrpSpPr>
+        <p:cNvPr id="152" name="Shape 152"/>
+        <p:cNvGrpSpPr/>
+        <p:nvPr/>
+      </p:nvGrpSpPr>
+      <p:grpSpPr>
+        <a:xfrm>
+          <a:off x="0" y="0"/>
+          <a:ext cx="0" cy="0"/>
+          <a:chOff x="0" y="0"/>
+          <a:chExt cx="0" cy="0"/>
+        </a:xfrm>
+      </p:grpSpPr>
+      <p:sp>
+        <p:nvSpPr>
+          <p:cNvPr id="153" name="Google Shape;153;gf157d98db7_0_0:notes"/>
+          <p:cNvSpPr/>
+          <p:nvPr>
+            <p:ph idx="2" type="sldImg"/>
+          </p:nvPr>
+        </p:nvSpPr>
+        <p:spPr>
+          <a:xfrm>
+            <a:off x="381300" y="685800"/>
+            <a:ext cx="6096000" cy="3429000"/>
+          </a:xfrm>
+          <a:custGeom>
+            <a:rect b="b" l="l" r="r" t="t"/>
+            <a:pathLst>
+              <a:path extrusionOk="0" h="120000" w="120000">
+                <a:moveTo>
+                  <a:pt x="0" y="0"/>
+                </a:moveTo>
+                <a:lnTo>
+                  <a:pt x="120000" y="0"/>
+                </a:lnTo>
+                <a:lnTo>
+                  <a:pt x="120000" y="120000"/>
+                </a:lnTo>
+                <a:lnTo>
+                  <a:pt x="0" y="120000"/>
+                </a:lnTo>
+                <a:close/>
+              </a:path>
+            </a:pathLst>
+          </a:custGeom>
+        </p:spPr>
+      </p:sp>
+      <p:sp>
+        <p:nvSpPr>
+          <p:cNvPr id="154" name="Google Shape;154;gf157d98db7_0_0:notes"/>
+          <p:cNvSpPr txBox="1"/>
+          <p:nvPr>
+            <p:ph idx="1" type="body"/>
+          </p:nvPr>
+        </p:nvSpPr>
+        <p:spPr>
+          <a:xfrm>
+            <a:off x="685800" y="4343400"/>
+            <a:ext cx="5486400" cy="4114800"/>
+          </a:xfrm>
+          <a:prstGeom prst="rect">
+            <a:avLst/>
+          </a:prstGeom>
+        </p:spPr>
+        <p:txBody>
+          <a:bodyPr anchorCtr="0" anchor="t" bIns="91425" lIns="91425" spcFirstLastPara="1" rIns="91425" wrap="square" tIns="91425">
+            <a:noAutofit/>
+          </a:bodyPr>
+          <a:lstStyle/>
+          <a:p>
+            <a:pPr indent="0" lvl="0" marL="0" rtl="0" algn="l">
+              <a:spcBef>
+                <a:spcPts val="0"/>
+              </a:spcBef>
+              <a:spcAft>
+                <a:spcPts val="0"/>
+              </a:spcAft>
+              <a:buNone/>
+            </a:pPr>
+            <a:r>
+              <a:t/>
+            </a:r>
+            <a:endParaRPr/>
+          </a:p>
+        </p:txBody>
+      </p:sp>
+    </p:spTree>
+  </p:cSld>
+  <p:clrMapOvr>
+    <a:masterClrMapping/>
+  </p:clrMapOvr>
+</p:notes>
+</file>
+
+<file path=ppt/notesSlides/notesSlide19.xml><?xml version="1.0" encoding="utf-8"?>
+<p:notes xmlns:a="http://schemas.openxmlformats.org/drawingml/2006/main" xmlns:r="http://schemas.openxmlformats.org/officeDocument/2006/relationships" xmlns:mc="http://schemas.openxmlformats.org/markup-compatibility/2006" xmlns:mv="urn:schemas-microsoft-com:mac:vml" xmlns:p="http://schemas.openxmlformats.org/presentationml/2006/main" xmlns:c="http://schemas.openxmlformats.org/drawingml/2006/chart" xmlns:dgm="http://schemas.openxmlformats.org/drawingml/2006/diagram" xmlns:o="urn:schemas-microsoft-com:office:office" xmlns:v="urn:schemas-microsoft-com:vml" xmlns:pvml="urn:schemas-microsoft-com:office:powerpoint" xmlns:com="http://schemas.openxmlformats.org/drawingml/2006/compatibility" xmlns:p14="http://schemas.microsoft.com/office/powerpoint/2010/main" xmlns:p15="http://schemas.microsoft.com/office/powerpoint/2012/main" xmlns:ahyp="http://schemas.microsoft.com/office/drawing/2018/hyperlinkcolor" showMasterPhAnim="0" showMasterSp="0">
+  <p:cSld>
+    <p:spTree>
+      <p:nvGrpSpPr>
+        <p:cNvPr id="158" name="Shape 158"/>
+        <p:cNvGrpSpPr/>
+        <p:nvPr/>
+      </p:nvGrpSpPr>
+      <p:grpSpPr>
+        <a:xfrm>
+          <a:off x="0" y="0"/>
+          <a:ext cx="0" cy="0"/>
+          <a:chOff x="0" y="0"/>
+          <a:chExt cx="0" cy="0"/>
+        </a:xfrm>
+      </p:grpSpPr>
+      <p:sp>
+        <p:nvSpPr>
+          <p:cNvPr id="159" name="Google Shape;159;gf157d98db7_0_5:notes"/>
+          <p:cNvSpPr/>
+          <p:nvPr>
+            <p:ph idx="2" type="sldImg"/>
+          </p:nvPr>
+        </p:nvSpPr>
+        <p:spPr>
+          <a:xfrm>
+            <a:off x="381300" y="685800"/>
+            <a:ext cx="6096000" cy="3429000"/>
+          </a:xfrm>
+          <a:custGeom>
+            <a:rect b="b" l="l" r="r" t="t"/>
+            <a:pathLst>
+              <a:path extrusionOk="0" h="120000" w="120000">
+                <a:moveTo>
+                  <a:pt x="0" y="0"/>
+                </a:moveTo>
+                <a:lnTo>
+                  <a:pt x="120000" y="0"/>
+                </a:lnTo>
+                <a:lnTo>
+                  <a:pt x="120000" y="120000"/>
+                </a:lnTo>
+                <a:lnTo>
+                  <a:pt x="0" y="120000"/>
+                </a:lnTo>
+                <a:close/>
+              </a:path>
+            </a:pathLst>
+          </a:custGeom>
+        </p:spPr>
+      </p:sp>
+      <p:sp>
+        <p:nvSpPr>
+          <p:cNvPr id="160" name="Google Shape;160;gf157d98db7_0_5:notes"/>
           <p:cNvSpPr txBox="1"/>
           <p:nvPr>
             <p:ph idx="1" type="body"/>
@@ -2206,7 +2406,7 @@
       </p:grpSpPr>
       <p:sp>
         <p:nvSpPr>
-          <p:cNvPr id="82" name="Google Shape;82;gf5a9b1405f_1_0:notes"/>
+          <p:cNvPr id="82" name="Google Shape;82;g2e6d6088977_0_0:notes"/>
           <p:cNvSpPr/>
           <p:nvPr>
             <p:ph idx="2" type="sldImg"/>
@@ -2241,7 +2441,7 @@
       </p:sp>
       <p:sp>
         <p:nvSpPr>
-          <p:cNvPr id="83" name="Google Shape;83;gf5a9b1405f_1_0:notes"/>
+          <p:cNvPr id="83" name="Google Shape;83;g2e6d6088977_0_0:notes"/>
           <p:cNvSpPr txBox="1"/>
           <p:nvPr>
             <p:ph idx="1" type="body"/>
@@ -2305,7 +2505,7 @@
       </p:grpSpPr>
       <p:sp>
         <p:nvSpPr>
-          <p:cNvPr id="89" name="Google Shape;89;gdb5ccdfa64_0_0:notes"/>
+          <p:cNvPr id="89" name="Google Shape;89;gf5a9b1405f_1_0:notes"/>
           <p:cNvSpPr/>
           <p:nvPr>
             <p:ph idx="2" type="sldImg"/>
@@ -2340,7 +2540,7 @@
       </p:sp>
       <p:sp>
         <p:nvSpPr>
-          <p:cNvPr id="90" name="Google Shape;90;gdb5ccdfa64_0_0:notes"/>
+          <p:cNvPr id="90" name="Google Shape;90;gf5a9b1405f_1_0:notes"/>
           <p:cNvSpPr txBox="1"/>
           <p:nvPr>
             <p:ph idx="1" type="body"/>
@@ -5716,7 +5916,7 @@
             </a:pPr>
             <a:r>
               <a:rPr lang="en"/>
-              <a:t>Dirk Riehle, Univ. Erlangen</a:t>
+              <a:t>Dirk Riehle, FAU Erlangen</a:t>
             </a:r>
             <a:endParaRPr/>
           </a:p>
@@ -5847,6 +6047,537 @@
             </a:pPr>
             <a:r>
               <a:rPr lang="en"/>
+              <a:t>Additional Rules</a:t>
+            </a:r>
+            <a:endParaRPr/>
+          </a:p>
+        </p:txBody>
+      </p:sp>
+      <p:sp>
+        <p:nvSpPr>
+          <p:cNvPr id="100" name="Google Shape;100;p17"/>
+          <p:cNvSpPr txBox="1"/>
+          <p:nvPr>
+            <p:ph idx="1" type="body"/>
+          </p:nvPr>
+        </p:nvSpPr>
+        <p:spPr>
+          <a:xfrm>
+            <a:off x="274320" y="914400"/>
+            <a:ext cx="8595300" cy="4114800"/>
+          </a:xfrm>
+          <a:prstGeom prst="rect">
+            <a:avLst/>
+          </a:prstGeom>
+        </p:spPr>
+        <p:txBody>
+          <a:bodyPr anchorCtr="0" anchor="t" bIns="0" lIns="0" spcFirstLastPara="1" rIns="0" wrap="square" tIns="0">
+            <a:noAutofit/>
+          </a:bodyPr>
+          <a:lstStyle/>
+          <a:p>
+            <a:pPr indent="0" lvl="0" marL="0" rtl="0" algn="l">
+              <a:spcBef>
+                <a:spcPts val="0"/>
+              </a:spcBef>
+              <a:spcAft>
+                <a:spcPts val="0"/>
+              </a:spcAft>
+              <a:buNone/>
+            </a:pPr>
+            <a:r>
+              <a:rPr lang="en"/>
+              <a:t>To pass the course, you must</a:t>
+            </a:r>
+            <a:endParaRPr/>
+          </a:p>
+          <a:p>
+            <a:pPr indent="-342900" lvl="0" marL="457200" rtl="0" algn="l">
+              <a:spcBef>
+                <a:spcPts val="1200"/>
+              </a:spcBef>
+              <a:spcAft>
+                <a:spcPts val="0"/>
+              </a:spcAft>
+              <a:buSzPts val="1800"/>
+              <a:buChar char="●"/>
+            </a:pPr>
+            <a:r>
+              <a:rPr lang="en"/>
+              <a:t>Participate in (all) project team meetings</a:t>
+            </a:r>
+            <a:endParaRPr/>
+          </a:p>
+          <a:p>
+            <a:pPr indent="-342900" lvl="0" marL="457200" rtl="0" algn="l">
+              <a:spcBef>
+                <a:spcPts val="0"/>
+              </a:spcBef>
+              <a:spcAft>
+                <a:spcPts val="0"/>
+              </a:spcAft>
+              <a:buSzPts val="1800"/>
+              <a:buChar char="●"/>
+            </a:pPr>
+            <a:r>
+              <a:rPr lang="en"/>
+              <a:t>Participate</a:t>
+            </a:r>
+            <a:r>
+              <a:rPr lang="en"/>
+              <a:t> in (all) weekly retrospectives (class sessions)</a:t>
+            </a:r>
+            <a:endParaRPr/>
+          </a:p>
+          <a:p>
+            <a:pPr indent="-342900" lvl="0" marL="457200" rtl="0" algn="l">
+              <a:spcBef>
+                <a:spcPts val="0"/>
+              </a:spcBef>
+              <a:spcAft>
+                <a:spcPts val="0"/>
+              </a:spcAft>
+              <a:buSzPts val="1800"/>
+              <a:buChar char="●"/>
+            </a:pPr>
+            <a:r>
+              <a:rPr lang="en"/>
+              <a:t>Perform the workshop and report about it</a:t>
+            </a:r>
+            <a:endParaRPr/>
+          </a:p>
+          <a:p>
+            <a:pPr indent="0" lvl="0" marL="0" rtl="0" algn="l">
+              <a:spcBef>
+                <a:spcPts val="1200"/>
+              </a:spcBef>
+              <a:spcAft>
+                <a:spcPts val="1200"/>
+              </a:spcAft>
+              <a:buNone/>
+            </a:pPr>
+            <a:r>
+              <a:t/>
+            </a:r>
+            <a:endParaRPr/>
+          </a:p>
+        </p:txBody>
+      </p:sp>
+      <p:sp>
+        <p:nvSpPr>
+          <p:cNvPr id="101" name="Google Shape;101;p17"/>
+          <p:cNvSpPr txBox="1"/>
+          <p:nvPr>
+            <p:ph idx="12" type="sldNum"/>
+          </p:nvPr>
+        </p:nvSpPr>
+        <p:spPr>
+          <a:xfrm>
+            <a:off x="7315202" y="4416550"/>
+            <a:ext cx="1828800" cy="731400"/>
+          </a:xfrm>
+          <a:prstGeom prst="rect">
+            <a:avLst/>
+          </a:prstGeom>
+        </p:spPr>
+        <p:txBody>
+          <a:bodyPr anchorCtr="0" anchor="b" bIns="91425" lIns="91425" spcFirstLastPara="1" rIns="91425" wrap="square" tIns="91425">
+            <a:noAutofit/>
+          </a:bodyPr>
+          <a:lstStyle/>
+          <a:p>
+            <a:pPr indent="0" lvl="0" marL="0" rtl="0" algn="r">
+              <a:spcBef>
+                <a:spcPts val="0"/>
+              </a:spcBef>
+              <a:spcAft>
+                <a:spcPts val="0"/>
+              </a:spcAft>
+              <a:buNone/>
+            </a:pPr>
+            <a:fld id="{00000000-1234-1234-1234-123412341234}" type="slidenum">
+              <a:rPr lang="en"/>
+              <a:t>‹#›</a:t>
+            </a:fld>
+            <a:endParaRPr/>
+          </a:p>
+          <a:p>
+            <a:pPr indent="0" lvl="0" marL="0" rtl="0" algn="r">
+              <a:spcBef>
+                <a:spcPts val="0"/>
+              </a:spcBef>
+              <a:spcAft>
+                <a:spcPts val="0"/>
+              </a:spcAft>
+              <a:buNone/>
+            </a:pPr>
+            <a:r>
+              <a:rPr b="0" lang="en" sz="900" u="sng">
+                <a:solidFill>
+                  <a:schemeClr val="hlink"/>
+                </a:solidFill>
+                <a:hlinkClick r:id="rId3"/>
+              </a:rPr>
+              <a:t>https://profriehle.com</a:t>
+            </a:r>
+            <a:r>
+              <a:rPr b="0" lang="en" sz="900">
+                <a:solidFill>
+                  <a:schemeClr val="dk2"/>
+                </a:solidFill>
+              </a:rPr>
+              <a:t> </a:t>
+            </a:r>
+            <a:endParaRPr/>
+          </a:p>
+        </p:txBody>
+      </p:sp>
+    </p:spTree>
+  </p:cSld>
+  <p:clrMapOvr>
+    <a:masterClrMapping/>
+  </p:clrMapOvr>
+</p:sld>
+</file>
+
+<file path=ppt/slides/slide11.xml><?xml version="1.0" encoding="utf-8"?>
+<p:sld xmlns:a="http://schemas.openxmlformats.org/drawingml/2006/main" xmlns:r="http://schemas.openxmlformats.org/officeDocument/2006/relationships" xmlns:mc="http://schemas.openxmlformats.org/markup-compatibility/2006" xmlns:mv="urn:schemas-microsoft-com:mac:vml" xmlns:p="http://schemas.openxmlformats.org/presentationml/2006/main" xmlns:c="http://schemas.openxmlformats.org/drawingml/2006/chart" xmlns:dgm="http://schemas.openxmlformats.org/drawingml/2006/diagram" xmlns:o="urn:schemas-microsoft-com:office:office" xmlns:v="urn:schemas-microsoft-com:vml" xmlns:pvml="urn:schemas-microsoft-com:office:powerpoint" xmlns:com="http://schemas.openxmlformats.org/drawingml/2006/compatibility" xmlns:p14="http://schemas.microsoft.com/office/powerpoint/2010/main" xmlns:p15="http://schemas.microsoft.com/office/powerpoint/2012/main" xmlns:ahyp="http://schemas.microsoft.com/office/drawing/2018/hyperlinkcolor">
+  <p:cSld>
+    <p:spTree>
+      <p:nvGrpSpPr>
+        <p:cNvPr id="105" name="Shape 105"/>
+        <p:cNvGrpSpPr/>
+        <p:nvPr/>
+      </p:nvGrpSpPr>
+      <p:grpSpPr>
+        <a:xfrm>
+          <a:off x="0" y="0"/>
+          <a:ext cx="0" cy="0"/>
+          <a:chOff x="0" y="0"/>
+          <a:chExt cx="0" cy="0"/>
+        </a:xfrm>
+      </p:grpSpPr>
+      <p:sp>
+        <p:nvSpPr>
+          <p:cNvPr id="106" name="Google Shape;106;p18"/>
+          <p:cNvSpPr txBox="1"/>
+          <p:nvPr>
+            <p:ph type="title"/>
+          </p:nvPr>
+        </p:nvSpPr>
+        <p:spPr>
+          <a:xfrm>
+            <a:off x="0" y="0"/>
+            <a:ext cx="9144000" cy="685800"/>
+          </a:xfrm>
+          <a:prstGeom prst="rect">
+            <a:avLst/>
+          </a:prstGeom>
+        </p:spPr>
+        <p:txBody>
+          <a:bodyPr anchorCtr="0" anchor="ctr" bIns="91425" lIns="274300" spcFirstLastPara="1" rIns="91425" wrap="square" tIns="91425">
+            <a:noAutofit/>
+          </a:bodyPr>
+          <a:lstStyle/>
+          <a:p>
+            <a:pPr indent="0" lvl="0" marL="0" rtl="0" algn="l">
+              <a:spcBef>
+                <a:spcPts val="0"/>
+              </a:spcBef>
+              <a:spcAft>
+                <a:spcPts val="0"/>
+              </a:spcAft>
+              <a:buNone/>
+            </a:pPr>
+            <a:r>
+              <a:rPr lang="en"/>
+              <a:t>Receiving a Grade for the Course</a:t>
+            </a:r>
+            <a:endParaRPr/>
+          </a:p>
+        </p:txBody>
+      </p:sp>
+      <p:sp>
+        <p:nvSpPr>
+          <p:cNvPr id="107" name="Google Shape;107;p18"/>
+          <p:cNvSpPr txBox="1"/>
+          <p:nvPr>
+            <p:ph idx="1" type="body"/>
+          </p:nvPr>
+        </p:nvSpPr>
+        <p:spPr>
+          <a:xfrm>
+            <a:off x="274320" y="914400"/>
+            <a:ext cx="8595300" cy="4114800"/>
+          </a:xfrm>
+          <a:prstGeom prst="rect">
+            <a:avLst/>
+          </a:prstGeom>
+        </p:spPr>
+        <p:txBody>
+          <a:bodyPr anchorCtr="0" anchor="t" bIns="0" lIns="0" spcFirstLastPara="1" rIns="0" wrap="square" tIns="0">
+            <a:noAutofit/>
+          </a:bodyPr>
+          <a:lstStyle/>
+          <a:p>
+            <a:pPr indent="0" lvl="0" marL="0" rtl="0" algn="l">
+              <a:spcBef>
+                <a:spcPts val="0"/>
+              </a:spcBef>
+              <a:spcAft>
+                <a:spcPts val="0"/>
+              </a:spcAft>
+              <a:buClr>
+                <a:schemeClr val="dk1"/>
+              </a:buClr>
+              <a:buSzPts val="1100"/>
+              <a:buFont typeface="Arial"/>
+              <a:buNone/>
+            </a:pPr>
+            <a:r>
+              <a:rPr lang="en"/>
+              <a:t>Course management and exam registration are two separate things</a:t>
+            </a:r>
+            <a:endParaRPr/>
+          </a:p>
+          <a:p>
+            <a:pPr indent="0" lvl="0" marL="0" rtl="0" algn="l">
+              <a:spcBef>
+                <a:spcPts val="1200"/>
+              </a:spcBef>
+              <a:spcAft>
+                <a:spcPts val="0"/>
+              </a:spcAft>
+              <a:buClr>
+                <a:schemeClr val="dk1"/>
+              </a:buClr>
+              <a:buSzPts val="1100"/>
+              <a:buFont typeface="Arial"/>
+              <a:buNone/>
+            </a:pPr>
+            <a:r>
+              <a:rPr lang="en"/>
+              <a:t>If you want to receive a grade</a:t>
+            </a:r>
+            <a:endParaRPr/>
+          </a:p>
+          <a:p>
+            <a:pPr indent="-342900" lvl="0" marL="457200" rtl="0" algn="l">
+              <a:spcBef>
+                <a:spcPts val="1200"/>
+              </a:spcBef>
+              <a:spcAft>
+                <a:spcPts val="0"/>
+              </a:spcAft>
+              <a:buSzPts val="1800"/>
+              <a:buChar char="●"/>
+            </a:pPr>
+            <a:r>
+              <a:rPr lang="en"/>
+              <a:t>You must register through your university’s exam registration system</a:t>
+            </a:r>
+            <a:endParaRPr/>
+          </a:p>
+          <a:p>
+            <a:pPr indent="-317500" lvl="1" marL="914400" rtl="0" algn="l">
+              <a:spcBef>
+                <a:spcPts val="0"/>
+              </a:spcBef>
+              <a:spcAft>
+                <a:spcPts val="0"/>
+              </a:spcAft>
+              <a:buSzPts val="1400"/>
+              <a:buChar char="○"/>
+            </a:pPr>
+            <a:r>
+              <a:rPr lang="en"/>
+              <a:t>Your degree program may have split the course into two (VL + UE)</a:t>
+            </a:r>
+            <a:endParaRPr/>
+          </a:p>
+          <a:p>
+            <a:pPr indent="-317500" lvl="1" marL="914400" rtl="0" algn="l">
+              <a:spcBef>
+                <a:spcPts val="0"/>
+              </a:spcBef>
+              <a:spcAft>
+                <a:spcPts val="0"/>
+              </a:spcAft>
+              <a:buSzPts val="1400"/>
+              <a:buChar char="○"/>
+            </a:pPr>
+            <a:r>
+              <a:rPr lang="en"/>
+              <a:t>Please check asap that the course is available in your degree program!</a:t>
+            </a:r>
+            <a:endParaRPr/>
+          </a:p>
+          <a:p>
+            <a:pPr indent="0" lvl="0" marL="0" rtl="0" algn="l">
+              <a:spcBef>
+                <a:spcPts val="1200"/>
+              </a:spcBef>
+              <a:spcAft>
+                <a:spcPts val="0"/>
+              </a:spcAft>
+              <a:buClr>
+                <a:schemeClr val="dk1"/>
+              </a:buClr>
+              <a:buSzPts val="1100"/>
+              <a:buFont typeface="Arial"/>
+              <a:buNone/>
+            </a:pPr>
+            <a:r>
+              <a:rPr lang="en"/>
+              <a:t>Otherwise: No grade</a:t>
+            </a:r>
+            <a:endParaRPr/>
+          </a:p>
+          <a:p>
+            <a:pPr indent="0" lvl="0" marL="0" rtl="0" algn="l">
+              <a:spcBef>
+                <a:spcPts val="1200"/>
+              </a:spcBef>
+              <a:spcAft>
+                <a:spcPts val="1200"/>
+              </a:spcAft>
+              <a:buNone/>
+            </a:pPr>
+            <a:r>
+              <a:t/>
+            </a:r>
+            <a:endParaRPr/>
+          </a:p>
+        </p:txBody>
+      </p:sp>
+      <p:sp>
+        <p:nvSpPr>
+          <p:cNvPr id="108" name="Google Shape;108;p18"/>
+          <p:cNvSpPr txBox="1"/>
+          <p:nvPr>
+            <p:ph idx="12" type="sldNum"/>
+          </p:nvPr>
+        </p:nvSpPr>
+        <p:spPr>
+          <a:xfrm>
+            <a:off x="7315202" y="4416550"/>
+            <a:ext cx="1828800" cy="731400"/>
+          </a:xfrm>
+          <a:prstGeom prst="rect">
+            <a:avLst/>
+          </a:prstGeom>
+        </p:spPr>
+        <p:txBody>
+          <a:bodyPr anchorCtr="0" anchor="b" bIns="91425" lIns="91425" spcFirstLastPara="1" rIns="91425" wrap="square" tIns="91425">
+            <a:noAutofit/>
+          </a:bodyPr>
+          <a:lstStyle/>
+          <a:p>
+            <a:pPr indent="0" lvl="0" marL="0" rtl="0" algn="r">
+              <a:spcBef>
+                <a:spcPts val="0"/>
+              </a:spcBef>
+              <a:spcAft>
+                <a:spcPts val="0"/>
+              </a:spcAft>
+              <a:buNone/>
+            </a:pPr>
+            <a:fld id="{00000000-1234-1234-1234-123412341234}" type="slidenum">
+              <a:rPr lang="en"/>
+              <a:t>‹#›</a:t>
+            </a:fld>
+            <a:endParaRPr/>
+          </a:p>
+          <a:p>
+            <a:pPr indent="0" lvl="0" marL="0" rtl="0" algn="r">
+              <a:spcBef>
+                <a:spcPts val="0"/>
+              </a:spcBef>
+              <a:spcAft>
+                <a:spcPts val="0"/>
+              </a:spcAft>
+              <a:buNone/>
+            </a:pPr>
+            <a:r>
+              <a:rPr b="0" lang="en" sz="900" u="sng">
+                <a:solidFill>
+                  <a:schemeClr val="hlink"/>
+                </a:solidFill>
+                <a:hlinkClick r:id="rId3"/>
+              </a:rPr>
+              <a:t>https://profriehle.com</a:t>
+            </a:r>
+            <a:r>
+              <a:rPr b="0" lang="en" sz="900">
+                <a:solidFill>
+                  <a:schemeClr val="dk2"/>
+                </a:solidFill>
+              </a:rPr>
+              <a:t> </a:t>
+            </a:r>
+            <a:endParaRPr/>
+          </a:p>
+        </p:txBody>
+      </p:sp>
+    </p:spTree>
+  </p:cSld>
+  <p:clrMapOvr>
+    <a:masterClrMapping/>
+  </p:clrMapOvr>
+</p:sld>
+</file>
+
+<file path=ppt/slides/slide12.xml><?xml version="1.0" encoding="utf-8"?>
+<p:sld xmlns:a="http://schemas.openxmlformats.org/drawingml/2006/main" xmlns:r="http://schemas.openxmlformats.org/officeDocument/2006/relationships" xmlns:mc="http://schemas.openxmlformats.org/markup-compatibility/2006" xmlns:mv="urn:schemas-microsoft-com:mac:vml" xmlns:p="http://schemas.openxmlformats.org/presentationml/2006/main" xmlns:c="http://schemas.openxmlformats.org/drawingml/2006/chart" xmlns:dgm="http://schemas.openxmlformats.org/drawingml/2006/diagram" xmlns:o="urn:schemas-microsoft-com:office:office" xmlns:v="urn:schemas-microsoft-com:vml" xmlns:pvml="urn:schemas-microsoft-com:office:powerpoint" xmlns:com="http://schemas.openxmlformats.org/drawingml/2006/compatibility" xmlns:p14="http://schemas.microsoft.com/office/powerpoint/2010/main" xmlns:p15="http://schemas.microsoft.com/office/powerpoint/2012/main" xmlns:ahyp="http://schemas.microsoft.com/office/drawing/2018/hyperlinkcolor">
+  <p:cSld>
+    <p:spTree>
+      <p:nvGrpSpPr>
+        <p:cNvPr id="112" name="Shape 112"/>
+        <p:cNvGrpSpPr/>
+        <p:nvPr/>
+      </p:nvGrpSpPr>
+      <p:grpSpPr>
+        <a:xfrm>
+          <a:off x="0" y="0"/>
+          <a:ext cx="0" cy="0"/>
+          <a:chOff x="0" y="0"/>
+          <a:chExt cx="0" cy="0"/>
+        </a:xfrm>
+      </p:grpSpPr>
+      <p:sp>
+        <p:nvSpPr>
+          <p:cNvPr id="113" name="Google Shape;113;p19"/>
+          <p:cNvSpPr txBox="1"/>
+          <p:nvPr>
+            <p:ph type="title"/>
+          </p:nvPr>
+        </p:nvSpPr>
+        <p:spPr>
+          <a:xfrm>
+            <a:off x="0" y="0"/>
+            <a:ext cx="9144000" cy="685800"/>
+          </a:xfrm>
+          <a:prstGeom prst="rect">
+            <a:avLst/>
+          </a:prstGeom>
+        </p:spPr>
+        <p:txBody>
+          <a:bodyPr anchorCtr="0" anchor="ctr" bIns="91425" lIns="274300" spcFirstLastPara="1" rIns="91425" wrap="square" tIns="91425">
+            <a:noAutofit/>
+          </a:bodyPr>
+          <a:lstStyle/>
+          <a:p>
+            <a:pPr indent="0" lvl="0" marL="0" rtl="0" algn="l">
+              <a:spcBef>
+                <a:spcPts val="0"/>
+              </a:spcBef>
+              <a:spcAft>
+                <a:spcPts val="0"/>
+              </a:spcAft>
+              <a:buNone/>
+            </a:pPr>
+            <a:r>
+              <a:rPr lang="en"/>
               <a:t>No Oral or Written Exam [1]</a:t>
             </a:r>
             <a:endParaRPr/>
@@ -5855,7 +6586,7 @@
       </p:sp>
       <p:pic>
         <p:nvPicPr>
-          <p:cNvPr id="100" name="Google Shape;100;p17"/>
+          <p:cNvPr id="114" name="Google Shape;114;p19"/>
           <p:cNvPicPr preferRelativeResize="0"/>
           <p:nvPr/>
         </p:nvPicPr>
@@ -5883,7 +6614,7 @@
       </p:pic>
       <p:sp>
         <p:nvSpPr>
-          <p:cNvPr id="101" name="Google Shape;101;p17"/>
+          <p:cNvPr id="115" name="Google Shape;115;p19"/>
           <p:cNvSpPr txBox="1"/>
           <p:nvPr/>
         </p:nvSpPr>
@@ -5918,559 +6649,6 @@
             <a:r>
               <a:rPr lang="en"/>
               <a:t>[1] You still have to register for the course</a:t>
-            </a:r>
-            <a:endParaRPr/>
-          </a:p>
-        </p:txBody>
-      </p:sp>
-      <p:sp>
-        <p:nvSpPr>
-          <p:cNvPr id="102" name="Google Shape;102;p17"/>
-          <p:cNvSpPr txBox="1"/>
-          <p:nvPr>
-            <p:ph idx="12" type="sldNum"/>
-          </p:nvPr>
-        </p:nvSpPr>
-        <p:spPr>
-          <a:xfrm>
-            <a:off x="7315202" y="4416550"/>
-            <a:ext cx="1828800" cy="731400"/>
-          </a:xfrm>
-          <a:prstGeom prst="rect">
-            <a:avLst/>
-          </a:prstGeom>
-        </p:spPr>
-        <p:txBody>
-          <a:bodyPr anchorCtr="0" anchor="b" bIns="91425" lIns="91425" spcFirstLastPara="1" rIns="91425" wrap="square" tIns="91425">
-            <a:noAutofit/>
-          </a:bodyPr>
-          <a:lstStyle/>
-          <a:p>
-            <a:pPr indent="0" lvl="0" marL="0" rtl="0" algn="r">
-              <a:spcBef>
-                <a:spcPts val="0"/>
-              </a:spcBef>
-              <a:spcAft>
-                <a:spcPts val="0"/>
-              </a:spcAft>
-              <a:buNone/>
-            </a:pPr>
-            <a:fld id="{00000000-1234-1234-1234-123412341234}" type="slidenum">
-              <a:rPr lang="en"/>
-              <a:t>‹#›</a:t>
-            </a:fld>
-            <a:endParaRPr/>
-          </a:p>
-          <a:p>
-            <a:pPr indent="0" lvl="0" marL="0" rtl="0" algn="r">
-              <a:spcBef>
-                <a:spcPts val="0"/>
-              </a:spcBef>
-              <a:spcAft>
-                <a:spcPts val="0"/>
-              </a:spcAft>
-              <a:buNone/>
-            </a:pPr>
-            <a:r>
-              <a:rPr b="0" lang="en" sz="900" u="sng">
-                <a:solidFill>
-                  <a:schemeClr val="hlink"/>
-                </a:solidFill>
-                <a:hlinkClick r:id="rId4"/>
-              </a:rPr>
-              <a:t>https://profriehle.com</a:t>
-            </a:r>
-            <a:r>
-              <a:rPr b="0" lang="en" sz="900">
-                <a:solidFill>
-                  <a:schemeClr val="dk2"/>
-                </a:solidFill>
-              </a:rPr>
-              <a:t> </a:t>
-            </a:r>
-            <a:endParaRPr/>
-          </a:p>
-        </p:txBody>
-      </p:sp>
-    </p:spTree>
-  </p:cSld>
-  <p:clrMapOvr>
-    <a:masterClrMapping/>
-  </p:clrMapOvr>
-</p:sld>
-</file>
-
-<file path=ppt/slides/slide11.xml><?xml version="1.0" encoding="utf-8"?>
-<p:sld xmlns:a="http://schemas.openxmlformats.org/drawingml/2006/main" xmlns:r="http://schemas.openxmlformats.org/officeDocument/2006/relationships" xmlns:mc="http://schemas.openxmlformats.org/markup-compatibility/2006" xmlns:mv="urn:schemas-microsoft-com:mac:vml" xmlns:p="http://schemas.openxmlformats.org/presentationml/2006/main" xmlns:c="http://schemas.openxmlformats.org/drawingml/2006/chart" xmlns:dgm="http://schemas.openxmlformats.org/drawingml/2006/diagram" xmlns:o="urn:schemas-microsoft-com:office:office" xmlns:v="urn:schemas-microsoft-com:vml" xmlns:pvml="urn:schemas-microsoft-com:office:powerpoint" xmlns:com="http://schemas.openxmlformats.org/drawingml/2006/compatibility" xmlns:p14="http://schemas.microsoft.com/office/powerpoint/2010/main" xmlns:p15="http://schemas.microsoft.com/office/powerpoint/2012/main" xmlns:ahyp="http://schemas.microsoft.com/office/drawing/2018/hyperlinkcolor">
-  <p:cSld>
-    <p:spTree>
-      <p:nvGrpSpPr>
-        <p:cNvPr id="106" name="Shape 106"/>
-        <p:cNvGrpSpPr/>
-        <p:nvPr/>
-      </p:nvGrpSpPr>
-      <p:grpSpPr>
-        <a:xfrm>
-          <a:off x="0" y="0"/>
-          <a:ext cx="0" cy="0"/>
-          <a:chOff x="0" y="0"/>
-          <a:chExt cx="0" cy="0"/>
-        </a:xfrm>
-      </p:grpSpPr>
-      <p:sp>
-        <p:nvSpPr>
-          <p:cNvPr id="107" name="Google Shape;107;p18"/>
-          <p:cNvSpPr txBox="1"/>
-          <p:nvPr>
-            <p:ph type="title"/>
-          </p:nvPr>
-        </p:nvSpPr>
-        <p:spPr>
-          <a:xfrm>
-            <a:off x="0" y="0"/>
-            <a:ext cx="9144000" cy="685800"/>
-          </a:xfrm>
-          <a:prstGeom prst="rect">
-            <a:avLst/>
-          </a:prstGeom>
-        </p:spPr>
-        <p:txBody>
-          <a:bodyPr anchorCtr="0" anchor="ctr" bIns="91425" lIns="274300" spcFirstLastPara="1" rIns="91425" wrap="square" tIns="91425">
-            <a:noAutofit/>
-          </a:bodyPr>
-          <a:lstStyle/>
-          <a:p>
-            <a:pPr indent="0" lvl="0" marL="0" rtl="0" algn="l">
-              <a:spcBef>
-                <a:spcPts val="0"/>
-              </a:spcBef>
-              <a:spcAft>
-                <a:spcPts val="0"/>
-              </a:spcAft>
-              <a:buNone/>
-            </a:pPr>
-            <a:r>
-              <a:rPr lang="en"/>
-              <a:t>Course Language</a:t>
-            </a:r>
-            <a:endParaRPr/>
-          </a:p>
-        </p:txBody>
-      </p:sp>
-      <p:sp>
-        <p:nvSpPr>
-          <p:cNvPr id="108" name="Google Shape;108;p18"/>
-          <p:cNvSpPr txBox="1"/>
-          <p:nvPr>
-            <p:ph idx="12" type="sldNum"/>
-          </p:nvPr>
-        </p:nvSpPr>
-        <p:spPr>
-          <a:xfrm>
-            <a:off x="7315202" y="4416550"/>
-            <a:ext cx="1828800" cy="731400"/>
-          </a:xfrm>
-          <a:prstGeom prst="rect">
-            <a:avLst/>
-          </a:prstGeom>
-        </p:spPr>
-        <p:txBody>
-          <a:bodyPr anchorCtr="0" anchor="b" bIns="91425" lIns="91425" spcFirstLastPara="1" rIns="91425" wrap="square" tIns="91425">
-            <a:noAutofit/>
-          </a:bodyPr>
-          <a:lstStyle/>
-          <a:p>
-            <a:pPr indent="0" lvl="0" marL="0" rtl="0" algn="r">
-              <a:spcBef>
-                <a:spcPts val="0"/>
-              </a:spcBef>
-              <a:spcAft>
-                <a:spcPts val="0"/>
-              </a:spcAft>
-              <a:buNone/>
-            </a:pPr>
-            <a:fld id="{00000000-1234-1234-1234-123412341234}" type="slidenum">
-              <a:rPr lang="en"/>
-              <a:t>‹#›</a:t>
-            </a:fld>
-            <a:endParaRPr/>
-          </a:p>
-          <a:p>
-            <a:pPr indent="0" lvl="0" marL="0" rtl="0" algn="r">
-              <a:spcBef>
-                <a:spcPts val="0"/>
-              </a:spcBef>
-              <a:spcAft>
-                <a:spcPts val="0"/>
-              </a:spcAft>
-              <a:buNone/>
-            </a:pPr>
-            <a:r>
-              <a:rPr b="0" lang="en" sz="900" u="sng">
-                <a:solidFill>
-                  <a:schemeClr val="hlink"/>
-                </a:solidFill>
-                <a:hlinkClick r:id="rId3"/>
-              </a:rPr>
-              <a:t>https://profriehle.com</a:t>
-            </a:r>
-            <a:r>
-              <a:rPr b="0" lang="en" sz="900">
-                <a:solidFill>
-                  <a:schemeClr val="dk2"/>
-                </a:solidFill>
-              </a:rPr>
-              <a:t> </a:t>
-            </a:r>
-            <a:endParaRPr/>
-          </a:p>
-        </p:txBody>
-      </p:sp>
-      <p:sp>
-        <p:nvSpPr>
-          <p:cNvPr id="109" name="Google Shape;109;p18"/>
-          <p:cNvSpPr txBox="1"/>
-          <p:nvPr>
-            <p:ph idx="1" type="body"/>
-          </p:nvPr>
-        </p:nvSpPr>
-        <p:spPr>
-          <a:xfrm>
-            <a:off x="274320" y="914400"/>
-            <a:ext cx="8595300" cy="4114800"/>
-          </a:xfrm>
-          <a:prstGeom prst="rect">
-            <a:avLst/>
-          </a:prstGeom>
-        </p:spPr>
-        <p:txBody>
-          <a:bodyPr anchorCtr="0" anchor="t" bIns="0" lIns="0" spcFirstLastPara="1" rIns="0" wrap="square" tIns="0">
-            <a:noAutofit/>
-          </a:bodyPr>
-          <a:lstStyle/>
-          <a:p>
-            <a:pPr indent="0" lvl="0" marL="0" rtl="0" algn="l">
-              <a:spcBef>
-                <a:spcPts val="0"/>
-              </a:spcBef>
-              <a:spcAft>
-                <a:spcPts val="0"/>
-              </a:spcAft>
-              <a:buClr>
-                <a:schemeClr val="dk1"/>
-              </a:buClr>
-              <a:buSzPts val="1100"/>
-              <a:buFont typeface="Arial"/>
-              <a:buNone/>
-            </a:pPr>
-            <a:r>
-              <a:rPr b="1" lang="en"/>
-              <a:t>Class</a:t>
-            </a:r>
-            <a:endParaRPr b="1"/>
-          </a:p>
-          <a:p>
-            <a:pPr indent="-342900" lvl="0" marL="457200" rtl="0" algn="l">
-              <a:spcBef>
-                <a:spcPts val="1200"/>
-              </a:spcBef>
-              <a:spcAft>
-                <a:spcPts val="0"/>
-              </a:spcAft>
-              <a:buSzPts val="1800"/>
-              <a:buChar char="●"/>
-            </a:pPr>
-            <a:r>
-              <a:rPr lang="en"/>
-              <a:t>Lecturer: English</a:t>
-            </a:r>
-            <a:endParaRPr/>
-          </a:p>
-          <a:p>
-            <a:pPr indent="-342900" lvl="0" marL="457200" rtl="0" algn="l">
-              <a:spcBef>
-                <a:spcPts val="0"/>
-              </a:spcBef>
-              <a:spcAft>
-                <a:spcPts val="0"/>
-              </a:spcAft>
-              <a:buSzPts val="1800"/>
-              <a:buChar char="●"/>
-            </a:pPr>
-            <a:r>
-              <a:rPr lang="en"/>
-              <a:t>Student: Choice of German or English</a:t>
-            </a:r>
-            <a:endParaRPr/>
-          </a:p>
-          <a:p>
-            <a:pPr indent="0" lvl="0" marL="0" rtl="0" algn="l">
-              <a:spcBef>
-                <a:spcPts val="1200"/>
-              </a:spcBef>
-              <a:spcAft>
-                <a:spcPts val="0"/>
-              </a:spcAft>
-              <a:buClr>
-                <a:schemeClr val="dk1"/>
-              </a:buClr>
-              <a:buSzPts val="1100"/>
-              <a:buFont typeface="Arial"/>
-              <a:buNone/>
-            </a:pPr>
-            <a:r>
-              <a:rPr b="1" lang="en"/>
-              <a:t>Project</a:t>
-            </a:r>
-            <a:endParaRPr b="1"/>
-          </a:p>
-          <a:p>
-            <a:pPr indent="-342900" lvl="0" marL="457200" rtl="0" algn="l">
-              <a:spcBef>
-                <a:spcPts val="1200"/>
-              </a:spcBef>
-              <a:spcAft>
-                <a:spcPts val="0"/>
-              </a:spcAft>
-              <a:buSzPts val="1800"/>
-              <a:buChar char="●"/>
-            </a:pPr>
-            <a:r>
-              <a:rPr lang="en"/>
-              <a:t>AMOS team: German or English</a:t>
-            </a:r>
-            <a:endParaRPr/>
-          </a:p>
-          <a:p>
-            <a:pPr indent="-342900" lvl="0" marL="457200" rtl="0" algn="l">
-              <a:spcBef>
-                <a:spcPts val="0"/>
-              </a:spcBef>
-              <a:spcAft>
-                <a:spcPts val="0"/>
-              </a:spcAft>
-              <a:buSzPts val="1800"/>
-              <a:buChar char="●"/>
-            </a:pPr>
-            <a:r>
-              <a:rPr lang="en"/>
-              <a:t>Homework: Choice of German or English</a:t>
-            </a:r>
-            <a:endParaRPr/>
-          </a:p>
-          <a:p>
-            <a:pPr indent="0" lvl="0" marL="0" rtl="0" algn="l">
-              <a:spcBef>
-                <a:spcPts val="1200"/>
-              </a:spcBef>
-              <a:spcAft>
-                <a:spcPts val="1200"/>
-              </a:spcAft>
-              <a:buNone/>
-            </a:pPr>
-            <a:r>
-              <a:t/>
-            </a:r>
-            <a:endParaRPr/>
-          </a:p>
-        </p:txBody>
-      </p:sp>
-    </p:spTree>
-  </p:cSld>
-  <p:clrMapOvr>
-    <a:masterClrMapping/>
-  </p:clrMapOvr>
-</p:sld>
-</file>
-
-<file path=ppt/slides/slide12.xml><?xml version="1.0" encoding="utf-8"?>
-<p:sld xmlns:a="http://schemas.openxmlformats.org/drawingml/2006/main" xmlns:r="http://schemas.openxmlformats.org/officeDocument/2006/relationships" xmlns:mc="http://schemas.openxmlformats.org/markup-compatibility/2006" xmlns:mv="urn:schemas-microsoft-com:mac:vml" xmlns:p="http://schemas.openxmlformats.org/presentationml/2006/main" xmlns:c="http://schemas.openxmlformats.org/drawingml/2006/chart" xmlns:dgm="http://schemas.openxmlformats.org/drawingml/2006/diagram" xmlns:o="urn:schemas-microsoft-com:office:office" xmlns:v="urn:schemas-microsoft-com:vml" xmlns:pvml="urn:schemas-microsoft-com:office:powerpoint" xmlns:com="http://schemas.openxmlformats.org/drawingml/2006/compatibility" xmlns:p14="http://schemas.microsoft.com/office/powerpoint/2010/main" xmlns:p15="http://schemas.microsoft.com/office/powerpoint/2012/main" xmlns:ahyp="http://schemas.microsoft.com/office/drawing/2018/hyperlinkcolor">
-  <p:cSld>
-    <p:spTree>
-      <p:nvGrpSpPr>
-        <p:cNvPr id="113" name="Shape 113"/>
-        <p:cNvGrpSpPr/>
-        <p:nvPr/>
-      </p:nvGrpSpPr>
-      <p:grpSpPr>
-        <a:xfrm>
-          <a:off x="0" y="0"/>
-          <a:ext cx="0" cy="0"/>
-          <a:chOff x="0" y="0"/>
-          <a:chExt cx="0" cy="0"/>
-        </a:xfrm>
-      </p:grpSpPr>
-      <p:sp>
-        <p:nvSpPr>
-          <p:cNvPr id="114" name="Google Shape;114;p19"/>
-          <p:cNvSpPr txBox="1"/>
-          <p:nvPr>
-            <p:ph type="title"/>
-          </p:nvPr>
-        </p:nvSpPr>
-        <p:spPr>
-          <a:xfrm>
-            <a:off x="0" y="0"/>
-            <a:ext cx="9144000" cy="685800"/>
-          </a:xfrm>
-          <a:prstGeom prst="rect">
-            <a:avLst/>
-          </a:prstGeom>
-        </p:spPr>
-        <p:txBody>
-          <a:bodyPr anchorCtr="0" anchor="ctr" bIns="91425" lIns="274300" spcFirstLastPara="1" rIns="91425" wrap="square" tIns="91425">
-            <a:noAutofit/>
-          </a:bodyPr>
-          <a:lstStyle/>
-          <a:p>
-            <a:pPr indent="0" lvl="0" marL="0" rtl="0" algn="l">
-              <a:spcBef>
-                <a:spcPts val="0"/>
-              </a:spcBef>
-              <a:spcAft>
-                <a:spcPts val="0"/>
-              </a:spcAft>
-              <a:buNone/>
-            </a:pPr>
-            <a:r>
-              <a:rPr lang="en"/>
-              <a:t>Course Organization</a:t>
-            </a:r>
-            <a:endParaRPr/>
-          </a:p>
-        </p:txBody>
-      </p:sp>
-      <p:sp>
-        <p:nvSpPr>
-          <p:cNvPr id="115" name="Google Shape;115;p19"/>
-          <p:cNvSpPr txBox="1"/>
-          <p:nvPr>
-            <p:ph idx="1" type="body"/>
-          </p:nvPr>
-        </p:nvSpPr>
-        <p:spPr>
-          <a:xfrm>
-            <a:off x="274320" y="914400"/>
-            <a:ext cx="8595300" cy="4114800"/>
-          </a:xfrm>
-          <a:prstGeom prst="rect">
-            <a:avLst/>
-          </a:prstGeom>
-        </p:spPr>
-        <p:txBody>
-          <a:bodyPr anchorCtr="0" anchor="t" bIns="0" lIns="0" spcFirstLastPara="1" rIns="0" wrap="square" tIns="0">
-            <a:noAutofit/>
-          </a:bodyPr>
-          <a:lstStyle/>
-          <a:p>
-            <a:pPr indent="0" lvl="0" marL="0" rtl="0" algn="l">
-              <a:spcBef>
-                <a:spcPts val="0"/>
-              </a:spcBef>
-              <a:spcAft>
-                <a:spcPts val="0"/>
-              </a:spcAft>
-              <a:buClr>
-                <a:schemeClr val="dk1"/>
-              </a:buClr>
-              <a:buSzPts val="1100"/>
-              <a:buFont typeface="Arial"/>
-              <a:buNone/>
-            </a:pPr>
-            <a:r>
-              <a:rPr b="1" lang="en"/>
-              <a:t>Course organization</a:t>
-            </a:r>
-            <a:endParaRPr b="1"/>
-          </a:p>
-          <a:p>
-            <a:pPr indent="-342900" lvl="0" marL="457200" rtl="0" algn="l">
-              <a:spcBef>
-                <a:spcPts val="1200"/>
-              </a:spcBef>
-              <a:spcAft>
-                <a:spcPts val="0"/>
-              </a:spcAft>
-              <a:buSzPts val="1800"/>
-              <a:buChar char="●"/>
-            </a:pPr>
-            <a:r>
-              <a:rPr lang="en"/>
-              <a:t>See </a:t>
-            </a:r>
-            <a:r>
-              <a:rPr lang="en" u="sng">
-                <a:solidFill>
-                  <a:schemeClr val="hlink"/>
-                </a:solidFill>
-                <a:hlinkClick r:id="rId3"/>
-              </a:rPr>
-              <a:t>https://coach.uni1.de</a:t>
-            </a:r>
-            <a:r>
-              <a:rPr lang="en"/>
-              <a:t>  </a:t>
-            </a:r>
-            <a:endParaRPr/>
-          </a:p>
-          <a:p>
-            <a:pPr indent="0" lvl="0" marL="0" rtl="0" algn="l">
-              <a:spcBef>
-                <a:spcPts val="1200"/>
-              </a:spcBef>
-              <a:spcAft>
-                <a:spcPts val="0"/>
-              </a:spcAft>
-              <a:buClr>
-                <a:schemeClr val="dk1"/>
-              </a:buClr>
-              <a:buSzPts val="1100"/>
-              <a:buFont typeface="Arial"/>
-              <a:buNone/>
-            </a:pPr>
-            <a:r>
-              <a:rPr b="1" lang="en"/>
-              <a:t>Course schedule</a:t>
-            </a:r>
-            <a:endParaRPr b="1"/>
-          </a:p>
-          <a:p>
-            <a:pPr indent="-342900" lvl="0" marL="457200" rtl="0" algn="l">
-              <a:spcBef>
-                <a:spcPts val="1200"/>
-              </a:spcBef>
-              <a:spcAft>
-                <a:spcPts val="0"/>
-              </a:spcAft>
-              <a:buSzPts val="1800"/>
-              <a:buChar char="●"/>
-            </a:pPr>
-            <a:r>
-              <a:rPr lang="en"/>
-              <a:t>See </a:t>
-            </a:r>
-            <a:r>
-              <a:rPr b="1" lang="en"/>
-              <a:t>Schedule</a:t>
-            </a:r>
-            <a:r>
-              <a:rPr lang="en"/>
-              <a:t> tab on Course organization doc</a:t>
-            </a:r>
-            <a:endParaRPr/>
-          </a:p>
-          <a:p>
-            <a:pPr indent="0" lvl="0" marL="0" rtl="0" algn="l">
-              <a:spcBef>
-                <a:spcPts val="1200"/>
-              </a:spcBef>
-              <a:spcAft>
-                <a:spcPts val="1200"/>
-              </a:spcAft>
-              <a:buNone/>
-            </a:pPr>
-            <a:r>
-              <a:t/>
             </a:r>
             <a:endParaRPr/>
           </a:p>
@@ -6604,7 +6782,7 @@
             </a:pPr>
             <a:r>
               <a:rPr lang="en"/>
-              <a:t>This Semester’s Projects</a:t>
+              <a:t>Course Language</a:t>
             </a:r>
             <a:endParaRPr/>
           </a:p>
@@ -6613,6 +6791,75 @@
       <p:sp>
         <p:nvSpPr>
           <p:cNvPr id="122" name="Google Shape;122;p20"/>
+          <p:cNvSpPr txBox="1"/>
+          <p:nvPr>
+            <p:ph idx="12" type="sldNum"/>
+          </p:nvPr>
+        </p:nvSpPr>
+        <p:spPr>
+          <a:xfrm>
+            <a:off x="7315202" y="4416550"/>
+            <a:ext cx="1828800" cy="731400"/>
+          </a:xfrm>
+          <a:prstGeom prst="rect">
+            <a:avLst/>
+          </a:prstGeom>
+        </p:spPr>
+        <p:txBody>
+          <a:bodyPr anchorCtr="0" anchor="b" bIns="91425" lIns="91425" spcFirstLastPara="1" rIns="91425" wrap="square" tIns="91425">
+            <a:noAutofit/>
+          </a:bodyPr>
+          <a:lstStyle/>
+          <a:p>
+            <a:pPr indent="0" lvl="0" marL="0" rtl="0" algn="r">
+              <a:spcBef>
+                <a:spcPts val="0"/>
+              </a:spcBef>
+              <a:spcAft>
+                <a:spcPts val="0"/>
+              </a:spcAft>
+              <a:buNone/>
+            </a:pPr>
+            <a:fld id="{00000000-1234-1234-1234-123412341234}" type="slidenum">
+              <a:rPr lang="en"/>
+              <a:t>‹#›</a:t>
+            </a:fld>
+            <a:endParaRPr/>
+          </a:p>
+          <a:p>
+            <a:pPr indent="0" lvl="0" marL="0" rtl="0" algn="r">
+              <a:spcBef>
+                <a:spcPts val="0"/>
+              </a:spcBef>
+              <a:spcAft>
+                <a:spcPts val="0"/>
+              </a:spcAft>
+              <a:buNone/>
+            </a:pPr>
+            <a:r>
+              <a:rPr b="0" lang="en" sz="900" u="sng">
+                <a:solidFill>
+                  <a:schemeClr val="hlink"/>
+                </a:solidFill>
+                <a:hlinkClick r:id="rId3"/>
+              </a:rPr>
+              <a:t>https://profriehle.com</a:t>
+            </a:r>
+            <a:r>
+              <a:rPr b="0" lang="en" sz="900">
+                <a:solidFill>
+                  <a:schemeClr val="dk2"/>
+                </a:solidFill>
+              </a:rPr>
+              <a:t> </a:t>
+            </a:r>
+            <a:endParaRPr/>
+          </a:p>
+        </p:txBody>
+      </p:sp>
+      <p:sp>
+        <p:nvSpPr>
+          <p:cNvPr id="123" name="Google Shape;123;p20"/>
           <p:cNvSpPr txBox="1"/>
           <p:nvPr>
             <p:ph idx="1" type="body"/>
@@ -6640,15 +6887,16 @@
               <a:spcAft>
                 <a:spcPts val="0"/>
               </a:spcAft>
+              <a:buClr>
+                <a:schemeClr val="dk1"/>
+              </a:buClr>
+              <a:buSzPts val="1100"/>
+              <a:buFont typeface="Arial"/>
               <a:buNone/>
             </a:pPr>
             <a:r>
               <a:rPr lang="en"/>
-              <a:t>A</a:t>
-            </a:r>
-            <a:r>
-              <a:rPr lang="en"/>
-              <a:t>MOS course organization</a:t>
+              <a:t>Class</a:t>
             </a:r>
             <a:endParaRPr/>
           </a:p>
@@ -6665,39 +6913,14 @@
             </a:pPr>
             <a:r>
               <a:rPr lang="en"/>
-              <a:t>See </a:t>
-            </a:r>
-            <a:r>
-              <a:rPr lang="en" u="sng">
-                <a:solidFill>
-                  <a:schemeClr val="hlink"/>
-                </a:solidFill>
-                <a:hlinkClick r:id="rId3"/>
-              </a:rPr>
-              <a:t>https://amos.uni1.de</a:t>
-            </a:r>
-            <a:endParaRPr/>
-          </a:p>
-          <a:p>
-            <a:pPr indent="0" lvl="0" marL="0" rtl="0" algn="l">
-              <a:spcBef>
-                <a:spcPts val="1200"/>
-              </a:spcBef>
-              <a:spcAft>
-                <a:spcPts val="0"/>
-              </a:spcAft>
-              <a:buNone/>
-            </a:pPr>
-            <a:r>
-              <a:rPr lang="en"/>
-              <a:t>Coach to team allocation</a:t>
+              <a:t>Lecturer: English</a:t>
             </a:r>
             <a:endParaRPr/>
           </a:p>
           <a:p>
             <a:pPr indent="-342900" lvl="0" marL="457200" rtl="0" algn="l">
               <a:spcBef>
-                <a:spcPts val="1200"/>
+                <a:spcPts val="0"/>
               </a:spcBef>
               <a:spcAft>
                 <a:spcPts val="0"/>
@@ -6707,84 +6930,77 @@
             </a:pPr>
             <a:r>
               <a:rPr lang="en"/>
-              <a:t>See </a:t>
-            </a:r>
-            <a:r>
-              <a:rPr b="1" lang="en"/>
-              <a:t>Project Teams</a:t>
-            </a:r>
+              <a:t>Student: Choice of German or English</a:t>
+            </a:r>
+            <a:endParaRPr/>
+          </a:p>
+          <a:p>
+            <a:pPr indent="0" lvl="0" marL="0" rtl="0" algn="l">
+              <a:spcBef>
+                <a:spcPts val="1200"/>
+              </a:spcBef>
+              <a:spcAft>
+                <a:spcPts val="0"/>
+              </a:spcAft>
+              <a:buClr>
+                <a:schemeClr val="dk1"/>
+              </a:buClr>
+              <a:buSzPts val="1100"/>
+              <a:buFont typeface="Arial"/>
+              <a:buNone/>
+            </a:pPr>
             <a:r>
               <a:rPr lang="en"/>
-              <a:t> tab on AMOS Course Organization doc </a:t>
-            </a:r>
-            <a:endParaRPr/>
-          </a:p>
-        </p:txBody>
-      </p:sp>
-      <p:sp>
-        <p:nvSpPr>
-          <p:cNvPr id="123" name="Google Shape;123;p20"/>
-          <p:cNvSpPr txBox="1"/>
-          <p:nvPr>
-            <p:ph idx="12" type="sldNum"/>
-          </p:nvPr>
-        </p:nvSpPr>
-        <p:spPr>
-          <a:xfrm>
-            <a:off x="7315202" y="4416550"/>
-            <a:ext cx="1828800" cy="731400"/>
-          </a:xfrm>
-          <a:prstGeom prst="rect">
-            <a:avLst/>
-          </a:prstGeom>
-        </p:spPr>
-        <p:txBody>
-          <a:bodyPr anchorCtr="0" anchor="b" bIns="91425" lIns="91425" spcFirstLastPara="1" rIns="91425" wrap="square" tIns="91425">
-            <a:noAutofit/>
-          </a:bodyPr>
-          <a:lstStyle/>
-          <a:p>
-            <a:pPr indent="0" lvl="0" marL="0" rtl="0" algn="r">
-              <a:spcBef>
-                <a:spcPts val="0"/>
-              </a:spcBef>
-              <a:spcAft>
-                <a:spcPts val="0"/>
-              </a:spcAft>
-              <a:buNone/>
-            </a:pPr>
-            <a:fld id="{00000000-1234-1234-1234-123412341234}" type="slidenum">
+              <a:t>Project</a:t>
+            </a:r>
+            <a:endParaRPr/>
+          </a:p>
+          <a:p>
+            <a:pPr indent="-342900" lvl="0" marL="457200" rtl="0" algn="l">
+              <a:spcBef>
+                <a:spcPts val="1200"/>
+              </a:spcBef>
+              <a:spcAft>
+                <a:spcPts val="0"/>
+              </a:spcAft>
+              <a:buSzPts val="1800"/>
+              <a:buChar char="●"/>
+            </a:pPr>
+            <a:r>
               <a:rPr lang="en"/>
-              <a:t>‹#›</a:t>
-            </a:fld>
-            <a:endParaRPr/>
-          </a:p>
-          <a:p>
-            <a:pPr indent="0" lvl="0" marL="0" rtl="0" algn="r">
-              <a:spcBef>
-                <a:spcPts val="0"/>
-              </a:spcBef>
-              <a:spcAft>
-                <a:spcPts val="0"/>
-              </a:spcAft>
-              <a:buNone/>
-            </a:pPr>
-            <a:r>
-              <a:rPr b="0" lang="en" sz="900" u="sng">
-                <a:solidFill>
-                  <a:schemeClr val="hlink"/>
-                </a:solidFill>
-                <a:hlinkClick r:id="rId4"/>
-              </a:rPr>
-              <a:t>https://profriehle.com</a:t>
-            </a:r>
-            <a:r>
-              <a:rPr b="0" lang="en" sz="900">
-                <a:solidFill>
-                  <a:schemeClr val="dk2"/>
-                </a:solidFill>
-              </a:rPr>
-              <a:t> </a:t>
+              <a:t>AMOS team: German or English</a:t>
+            </a:r>
+            <a:endParaRPr/>
+          </a:p>
+          <a:p>
+            <a:pPr indent="-342900" lvl="0" marL="457200" rtl="0" algn="l">
+              <a:spcBef>
+                <a:spcPts val="0"/>
+              </a:spcBef>
+              <a:spcAft>
+                <a:spcPts val="0"/>
+              </a:spcAft>
+              <a:buSzPts val="1800"/>
+              <a:buChar char="●"/>
+            </a:pPr>
+            <a:r>
+              <a:rPr lang="en"/>
+              <a:t>Homework: Choice of German or English</a:t>
+            </a:r>
+            <a:endParaRPr/>
+          </a:p>
+          <a:p>
+            <a:pPr indent="0" lvl="0" marL="0" rtl="0" algn="l">
+              <a:spcBef>
+                <a:spcPts val="1200"/>
+              </a:spcBef>
+              <a:spcAft>
+                <a:spcPts val="1200"/>
+              </a:spcAft>
+              <a:buNone/>
+            </a:pPr>
+            <a:r>
+              <a:t/>
             </a:r>
             <a:endParaRPr/>
           </a:p>
@@ -6849,7 +7065,7 @@
             </a:pPr>
             <a:r>
               <a:rPr lang="en"/>
-              <a:t>Work Rhythm</a:t>
+              <a:t>Course Organization</a:t>
             </a:r>
             <a:endParaRPr/>
           </a:p>
@@ -6858,6 +7074,134 @@
       <p:sp>
         <p:nvSpPr>
           <p:cNvPr id="129" name="Google Shape;129;p21"/>
+          <p:cNvSpPr txBox="1"/>
+          <p:nvPr>
+            <p:ph idx="1" type="body"/>
+          </p:nvPr>
+        </p:nvSpPr>
+        <p:spPr>
+          <a:xfrm>
+            <a:off x="274320" y="914400"/>
+            <a:ext cx="8595300" cy="4114800"/>
+          </a:xfrm>
+          <a:prstGeom prst="rect">
+            <a:avLst/>
+          </a:prstGeom>
+        </p:spPr>
+        <p:txBody>
+          <a:bodyPr anchorCtr="0" anchor="t" bIns="0" lIns="0" spcFirstLastPara="1" rIns="0" wrap="square" tIns="0">
+            <a:noAutofit/>
+          </a:bodyPr>
+          <a:lstStyle/>
+          <a:p>
+            <a:pPr indent="0" lvl="0" marL="0" rtl="0" algn="l">
+              <a:spcBef>
+                <a:spcPts val="0"/>
+              </a:spcBef>
+              <a:spcAft>
+                <a:spcPts val="0"/>
+              </a:spcAft>
+              <a:buClr>
+                <a:schemeClr val="dk1"/>
+              </a:buClr>
+              <a:buSzPts val="1100"/>
+              <a:buFont typeface="Arial"/>
+              <a:buNone/>
+            </a:pPr>
+            <a:r>
+              <a:rPr lang="en"/>
+              <a:t>Course organization</a:t>
+            </a:r>
+            <a:endParaRPr/>
+          </a:p>
+          <a:p>
+            <a:pPr indent="-342900" lvl="0" marL="457200" rtl="0" algn="l">
+              <a:spcBef>
+                <a:spcPts val="1200"/>
+              </a:spcBef>
+              <a:spcAft>
+                <a:spcPts val="0"/>
+              </a:spcAft>
+              <a:buSzPts val="1800"/>
+              <a:buChar char="●"/>
+            </a:pPr>
+            <a:r>
+              <a:rPr lang="en"/>
+              <a:t>See </a:t>
+            </a:r>
+            <a:r>
+              <a:rPr lang="en" u="sng">
+                <a:solidFill>
+                  <a:schemeClr val="hlink"/>
+                </a:solidFill>
+                <a:hlinkClick r:id="rId3"/>
+              </a:rPr>
+              <a:t>https://coach.uni1.de</a:t>
+            </a:r>
+            <a:r>
+              <a:rPr lang="en"/>
+              <a:t>  </a:t>
+            </a:r>
+            <a:endParaRPr/>
+          </a:p>
+          <a:p>
+            <a:pPr indent="0" lvl="0" marL="0" rtl="0" algn="l">
+              <a:spcBef>
+                <a:spcPts val="1200"/>
+              </a:spcBef>
+              <a:spcAft>
+                <a:spcPts val="0"/>
+              </a:spcAft>
+              <a:buClr>
+                <a:schemeClr val="dk1"/>
+              </a:buClr>
+              <a:buSzPts val="1100"/>
+              <a:buFont typeface="Arial"/>
+              <a:buNone/>
+            </a:pPr>
+            <a:r>
+              <a:rPr lang="en"/>
+              <a:t>Course schedule</a:t>
+            </a:r>
+            <a:endParaRPr/>
+          </a:p>
+          <a:p>
+            <a:pPr indent="-342900" lvl="0" marL="457200" rtl="0" algn="l">
+              <a:spcBef>
+                <a:spcPts val="1200"/>
+              </a:spcBef>
+              <a:spcAft>
+                <a:spcPts val="0"/>
+              </a:spcAft>
+              <a:buSzPts val="1800"/>
+              <a:buChar char="●"/>
+            </a:pPr>
+            <a:r>
+              <a:rPr lang="en"/>
+              <a:t>See Schedule tab on Course organization doc</a:t>
+            </a:r>
+            <a:endParaRPr/>
+          </a:p>
+          <a:p>
+            <a:pPr indent="0" lvl="0" marL="0" rtl="0" algn="l">
+              <a:spcBef>
+                <a:spcPts val="1200"/>
+              </a:spcBef>
+              <a:spcAft>
+                <a:spcPts val="1200"/>
+              </a:spcAft>
+              <a:buNone/>
+            </a:pPr>
+            <a:r>
+              <a:t/>
+            </a:r>
+            <a:endParaRPr/>
+          </a:p>
+        </p:txBody>
+      </p:sp>
+      <p:sp>
+        <p:nvSpPr>
+          <p:cNvPr id="130" name="Google Shape;130;p21"/>
           <p:cNvSpPr txBox="1"/>
           <p:nvPr>
             <p:ph idx="12" type="sldNum"/>
@@ -6908,7 +7252,7 @@
                 <a:solidFill>
                   <a:schemeClr val="hlink"/>
                 </a:solidFill>
-                <a:hlinkClick r:id="rId3"/>
+                <a:hlinkClick r:id="rId4"/>
               </a:rPr>
               <a:t>https://profriehle.com</a:t>
             </a:r>
@@ -6919,151 +7263,6 @@
                 </a:solidFill>
               </a:rPr>
               <a:t> </a:t>
-            </a:r>
-            <a:endParaRPr/>
-          </a:p>
-        </p:txBody>
-      </p:sp>
-      <p:sp>
-        <p:nvSpPr>
-          <p:cNvPr id="130" name="Google Shape;130;p21"/>
-          <p:cNvSpPr txBox="1"/>
-          <p:nvPr>
-            <p:ph idx="1" type="body"/>
-          </p:nvPr>
-        </p:nvSpPr>
-        <p:spPr>
-          <a:xfrm>
-            <a:off x="274320" y="914400"/>
-            <a:ext cx="8595300" cy="4114800"/>
-          </a:xfrm>
-          <a:prstGeom prst="rect">
-            <a:avLst/>
-          </a:prstGeom>
-        </p:spPr>
-        <p:txBody>
-          <a:bodyPr anchorCtr="0" anchor="t" bIns="0" lIns="0" spcFirstLastPara="1" rIns="0" wrap="square" tIns="0">
-            <a:noAutofit/>
-          </a:bodyPr>
-          <a:lstStyle/>
-          <a:p>
-            <a:pPr indent="-342900" lvl="0" marL="457200" rtl="0" algn="l">
-              <a:spcBef>
-                <a:spcPts val="0"/>
-              </a:spcBef>
-              <a:spcAft>
-                <a:spcPts val="0"/>
-              </a:spcAft>
-              <a:buSzPts val="1800"/>
-              <a:buAutoNum type="arabicPeriod"/>
-            </a:pPr>
-            <a:r>
-              <a:rPr lang="en"/>
-              <a:t>Lecture (class discussion)</a:t>
-            </a:r>
-            <a:endParaRPr/>
-          </a:p>
-          <a:p>
-            <a:pPr indent="-317500" lvl="1" marL="914400" rtl="0" algn="l">
-              <a:spcBef>
-                <a:spcPts val="0"/>
-              </a:spcBef>
-              <a:spcAft>
-                <a:spcPts val="0"/>
-              </a:spcAft>
-              <a:buSzPts val="1400"/>
-              <a:buChar char="○"/>
-            </a:pPr>
-            <a:r>
-              <a:rPr lang="en"/>
-              <a:t>Retrospectiv</a:t>
-            </a:r>
-            <a:r>
-              <a:rPr lang="en"/>
-              <a:t>e</a:t>
-            </a:r>
-            <a:endParaRPr/>
-          </a:p>
-          <a:p>
-            <a:pPr indent="-342900" lvl="0" marL="457200" rtl="0" algn="l">
-              <a:spcBef>
-                <a:spcPts val="1000"/>
-              </a:spcBef>
-              <a:spcAft>
-                <a:spcPts val="0"/>
-              </a:spcAft>
-              <a:buSzPts val="1800"/>
-              <a:buAutoNum type="arabicPeriod"/>
-            </a:pPr>
-            <a:r>
-              <a:rPr lang="en"/>
-              <a:t>Exercise (team meetings)</a:t>
-            </a:r>
-            <a:endParaRPr/>
-          </a:p>
-          <a:p>
-            <a:pPr indent="-317500" lvl="1" marL="914400" rtl="0" algn="l">
-              <a:spcBef>
-                <a:spcPts val="0"/>
-              </a:spcBef>
-              <a:spcAft>
-                <a:spcPts val="0"/>
-              </a:spcAft>
-              <a:buSzPts val="1400"/>
-              <a:buChar char="○"/>
-            </a:pPr>
-            <a:r>
-              <a:rPr lang="en"/>
-              <a:t>AMOS team meeting</a:t>
-            </a:r>
-            <a:endParaRPr/>
-          </a:p>
-          <a:p>
-            <a:pPr indent="-342900" lvl="0" marL="457200" rtl="0" algn="l">
-              <a:spcBef>
-                <a:spcPts val="1000"/>
-              </a:spcBef>
-              <a:spcAft>
-                <a:spcPts val="0"/>
-              </a:spcAft>
-              <a:buSzPts val="1800"/>
-              <a:buAutoNum type="arabicPeriod"/>
-            </a:pPr>
-            <a:r>
-              <a:rPr lang="en"/>
-              <a:t>Homework (self-organized)</a:t>
-            </a:r>
-            <a:endParaRPr/>
-          </a:p>
-          <a:p>
-            <a:pPr indent="-317500" lvl="1" marL="914400" rtl="0" algn="l">
-              <a:spcBef>
-                <a:spcPts val="0"/>
-              </a:spcBef>
-              <a:spcAft>
-                <a:spcPts val="0"/>
-              </a:spcAft>
-              <a:buSzPts val="1400"/>
-              <a:buChar char="○"/>
-            </a:pPr>
-            <a:r>
-              <a:rPr lang="en"/>
-              <a:t>See Course Organization doc</a:t>
-            </a:r>
-            <a:endParaRPr/>
-          </a:p>
-          <a:p>
-            <a:pPr indent="0" lvl="0" marL="0" rtl="0" algn="l">
-              <a:spcBef>
-                <a:spcPts val="1200"/>
-              </a:spcBef>
-              <a:spcAft>
-                <a:spcPts val="1200"/>
-              </a:spcAft>
-              <a:buNone/>
-            </a:pPr>
-            <a:r>
-              <a:t/>
             </a:r>
             <a:endParaRPr/>
           </a:p>
@@ -7128,7 +7327,7 @@
             </a:pPr>
             <a:r>
               <a:rPr lang="en"/>
-              <a:t>Course Communication</a:t>
+              <a:t>This Semester’s Projects</a:t>
             </a:r>
             <a:endParaRPr/>
           </a:p>
@@ -7167,12 +7366,8 @@
               <a:buNone/>
             </a:pPr>
             <a:r>
-              <a:rPr b="1" lang="en"/>
-              <a:t>Announcements</a:t>
-            </a:r>
-            <a:r>
               <a:rPr lang="en"/>
-              <a:t> are sent by email</a:t>
+              <a:t>AMOS course organization</a:t>
             </a:r>
             <a:endParaRPr/>
           </a:p>
@@ -7189,14 +7384,43 @@
             </a:pPr>
             <a:r>
               <a:rPr lang="en"/>
-              <a:t>Through email aliases</a:t>
+              <a:t>See </a:t>
+            </a:r>
+            <a:r>
+              <a:rPr lang="en" u="sng">
+                <a:solidFill>
+                  <a:schemeClr val="hlink"/>
+                </a:solidFill>
+                <a:hlinkClick r:id="rId3"/>
+              </a:rPr>
+              <a:t>https://uni1.de/amos/index</a:t>
+            </a:r>
+            <a:r>
+              <a:rPr lang="en"/>
+              <a:t> </a:t>
+            </a:r>
+            <a:endParaRPr/>
+          </a:p>
+          <a:p>
+            <a:pPr indent="0" lvl="0" marL="0" rtl="0" algn="l">
+              <a:spcBef>
+                <a:spcPts val="1200"/>
+              </a:spcBef>
+              <a:spcAft>
+                <a:spcPts val="0"/>
+              </a:spcAft>
+              <a:buNone/>
+            </a:pPr>
+            <a:r>
+              <a:rPr lang="en"/>
+              <a:t>Coach to team allocation</a:t>
             </a:r>
             <a:endParaRPr/>
           </a:p>
           <a:p>
             <a:pPr indent="-342900" lvl="0" marL="457200" rtl="0" algn="l">
               <a:spcBef>
-                <a:spcPts val="0"/>
+                <a:spcPts val="1200"/>
               </a:spcBef>
               <a:spcAft>
                 <a:spcPts val="0"/>
@@ -7206,111 +7430,7 @@
             </a:pPr>
             <a:r>
               <a:rPr lang="en"/>
-              <a:t>Through course management system</a:t>
-            </a:r>
-            <a:endParaRPr/>
-          </a:p>
-          <a:p>
-            <a:pPr indent="0" lvl="0" marL="0" rtl="0" algn="l">
-              <a:spcBef>
-                <a:spcPts val="1200"/>
-              </a:spcBef>
-              <a:spcAft>
-                <a:spcPts val="0"/>
-              </a:spcAft>
-              <a:buNone/>
-            </a:pPr>
-            <a:r>
-              <a:rPr b="1" lang="en"/>
-              <a:t>Administrative questions</a:t>
-            </a:r>
-            <a:r>
-              <a:rPr lang="en"/>
-              <a:t> to teaching team</a:t>
-            </a:r>
-            <a:endParaRPr/>
-          </a:p>
-          <a:p>
-            <a:pPr indent="-342900" lvl="0" marL="457200" rtl="0" algn="l">
-              <a:spcBef>
-                <a:spcPts val="1200"/>
-              </a:spcBef>
-              <a:spcAft>
-                <a:spcPts val="0"/>
-              </a:spcAft>
-              <a:buSzPts val="1800"/>
-              <a:buChar char="●"/>
-            </a:pPr>
-            <a:r>
-              <a:rPr lang="en"/>
-              <a:t>Please ask your question in the COACH backchannel</a:t>
-            </a:r>
-            <a:endParaRPr/>
-          </a:p>
-          <a:p>
-            <a:pPr indent="-342900" lvl="0" marL="457200" rtl="0" algn="l">
-              <a:spcBef>
-                <a:spcPts val="0"/>
-              </a:spcBef>
-              <a:spcAft>
-                <a:spcPts val="0"/>
-              </a:spcAft>
-              <a:buSzPts val="1800"/>
-              <a:buChar char="●"/>
-            </a:pPr>
-            <a:r>
-              <a:rPr lang="en"/>
-              <a:t>For private questions, use the teaching team email alias</a:t>
-            </a:r>
-            <a:endParaRPr/>
-          </a:p>
-          <a:p>
-            <a:pPr indent="0" lvl="0" marL="0" rtl="0" algn="l">
-              <a:spcBef>
-                <a:spcPts val="1200"/>
-              </a:spcBef>
-              <a:spcAft>
-                <a:spcPts val="0"/>
-              </a:spcAft>
-              <a:buNone/>
-            </a:pPr>
-            <a:r>
-              <a:t/>
-            </a:r>
-            <a:endParaRPr/>
-          </a:p>
-          <a:p>
-            <a:pPr indent="0" lvl="0" marL="0" rtl="0" algn="l">
-              <a:spcBef>
-                <a:spcPts val="1200"/>
-              </a:spcBef>
-              <a:spcAft>
-                <a:spcPts val="0"/>
-              </a:spcAft>
-              <a:buClr>
-                <a:schemeClr val="dk1"/>
-              </a:buClr>
-              <a:buSzPts val="1100"/>
-              <a:buFont typeface="Arial"/>
-              <a:buNone/>
-            </a:pPr>
-            <a:r>
-              <a:t/>
-            </a:r>
-            <a:endParaRPr/>
-          </a:p>
-          <a:p>
-            <a:pPr indent="0" lvl="0" marL="0" rtl="0" algn="l">
-              <a:spcBef>
-                <a:spcPts val="1200"/>
-              </a:spcBef>
-              <a:spcAft>
-                <a:spcPts val="1200"/>
-              </a:spcAft>
-              <a:buNone/>
-            </a:pPr>
-            <a:r>
-              <a:t/>
+              <a:t>By email</a:t>
             </a:r>
             <a:endParaRPr/>
           </a:p>
@@ -7369,7 +7489,7 @@
                 <a:solidFill>
                   <a:schemeClr val="hlink"/>
                 </a:solidFill>
-                <a:hlinkClick r:id="rId3"/>
+                <a:hlinkClick r:id="rId4"/>
               </a:rPr>
               <a:t>https://profriehle.com</a:t>
             </a:r>
@@ -7415,6 +7535,543 @@
           <p:cNvPr id="142" name="Google Shape;142;p23"/>
           <p:cNvSpPr txBox="1"/>
           <p:nvPr>
+            <p:ph type="title"/>
+          </p:nvPr>
+        </p:nvSpPr>
+        <p:spPr>
+          <a:xfrm>
+            <a:off x="0" y="0"/>
+            <a:ext cx="9144000" cy="685800"/>
+          </a:xfrm>
+          <a:prstGeom prst="rect">
+            <a:avLst/>
+          </a:prstGeom>
+        </p:spPr>
+        <p:txBody>
+          <a:bodyPr anchorCtr="0" anchor="ctr" bIns="91425" lIns="274300" spcFirstLastPara="1" rIns="91425" wrap="square" tIns="91425">
+            <a:noAutofit/>
+          </a:bodyPr>
+          <a:lstStyle/>
+          <a:p>
+            <a:pPr indent="0" lvl="0" marL="0" rtl="0" algn="l">
+              <a:spcBef>
+                <a:spcPts val="0"/>
+              </a:spcBef>
+              <a:spcAft>
+                <a:spcPts val="0"/>
+              </a:spcAft>
+              <a:buNone/>
+            </a:pPr>
+            <a:r>
+              <a:rPr lang="en"/>
+              <a:t>Work Rhythm</a:t>
+            </a:r>
+            <a:endParaRPr/>
+          </a:p>
+        </p:txBody>
+      </p:sp>
+      <p:sp>
+        <p:nvSpPr>
+          <p:cNvPr id="143" name="Google Shape;143;p23"/>
+          <p:cNvSpPr txBox="1"/>
+          <p:nvPr>
+            <p:ph idx="12" type="sldNum"/>
+          </p:nvPr>
+        </p:nvSpPr>
+        <p:spPr>
+          <a:xfrm>
+            <a:off x="7315202" y="4416550"/>
+            <a:ext cx="1828800" cy="731400"/>
+          </a:xfrm>
+          <a:prstGeom prst="rect">
+            <a:avLst/>
+          </a:prstGeom>
+        </p:spPr>
+        <p:txBody>
+          <a:bodyPr anchorCtr="0" anchor="b" bIns="91425" lIns="91425" spcFirstLastPara="1" rIns="91425" wrap="square" tIns="91425">
+            <a:noAutofit/>
+          </a:bodyPr>
+          <a:lstStyle/>
+          <a:p>
+            <a:pPr indent="0" lvl="0" marL="0" rtl="0" algn="r">
+              <a:spcBef>
+                <a:spcPts val="0"/>
+              </a:spcBef>
+              <a:spcAft>
+                <a:spcPts val="0"/>
+              </a:spcAft>
+              <a:buNone/>
+            </a:pPr>
+            <a:fld id="{00000000-1234-1234-1234-123412341234}" type="slidenum">
+              <a:rPr lang="en"/>
+              <a:t>‹#›</a:t>
+            </a:fld>
+            <a:endParaRPr/>
+          </a:p>
+          <a:p>
+            <a:pPr indent="0" lvl="0" marL="0" rtl="0" algn="r">
+              <a:spcBef>
+                <a:spcPts val="0"/>
+              </a:spcBef>
+              <a:spcAft>
+                <a:spcPts val="0"/>
+              </a:spcAft>
+              <a:buNone/>
+            </a:pPr>
+            <a:r>
+              <a:rPr b="0" lang="en" sz="900" u="sng">
+                <a:solidFill>
+                  <a:schemeClr val="hlink"/>
+                </a:solidFill>
+                <a:hlinkClick r:id="rId3"/>
+              </a:rPr>
+              <a:t>https://profriehle.com</a:t>
+            </a:r>
+            <a:r>
+              <a:rPr b="0" lang="en" sz="900">
+                <a:solidFill>
+                  <a:schemeClr val="dk2"/>
+                </a:solidFill>
+              </a:rPr>
+              <a:t> </a:t>
+            </a:r>
+            <a:endParaRPr/>
+          </a:p>
+        </p:txBody>
+      </p:sp>
+      <p:sp>
+        <p:nvSpPr>
+          <p:cNvPr id="144" name="Google Shape;144;p23"/>
+          <p:cNvSpPr txBox="1"/>
+          <p:nvPr>
+            <p:ph idx="1" type="body"/>
+          </p:nvPr>
+        </p:nvSpPr>
+        <p:spPr>
+          <a:xfrm>
+            <a:off x="274320" y="914400"/>
+            <a:ext cx="8595300" cy="4114800"/>
+          </a:xfrm>
+          <a:prstGeom prst="rect">
+            <a:avLst/>
+          </a:prstGeom>
+        </p:spPr>
+        <p:txBody>
+          <a:bodyPr anchorCtr="0" anchor="t" bIns="0" lIns="0" spcFirstLastPara="1" rIns="0" wrap="square" tIns="0">
+            <a:noAutofit/>
+          </a:bodyPr>
+          <a:lstStyle/>
+          <a:p>
+            <a:pPr indent="-342900" lvl="0" marL="457200" rtl="0" algn="l">
+              <a:spcBef>
+                <a:spcPts val="0"/>
+              </a:spcBef>
+              <a:spcAft>
+                <a:spcPts val="0"/>
+              </a:spcAft>
+              <a:buSzPts val="1800"/>
+              <a:buAutoNum type="arabicPeriod"/>
+            </a:pPr>
+            <a:r>
+              <a:rPr lang="en"/>
+              <a:t>Lecture (class discussion)</a:t>
+            </a:r>
+            <a:endParaRPr/>
+          </a:p>
+          <a:p>
+            <a:pPr indent="-317500" lvl="1" marL="914400" rtl="0" algn="l">
+              <a:spcBef>
+                <a:spcPts val="0"/>
+              </a:spcBef>
+              <a:spcAft>
+                <a:spcPts val="0"/>
+              </a:spcAft>
+              <a:buSzPts val="1400"/>
+              <a:buChar char="○"/>
+            </a:pPr>
+            <a:r>
+              <a:rPr lang="en"/>
+              <a:t>Retrospectiv</a:t>
+            </a:r>
+            <a:r>
+              <a:rPr lang="en"/>
+              <a:t>e</a:t>
+            </a:r>
+            <a:endParaRPr/>
+          </a:p>
+          <a:p>
+            <a:pPr indent="-342900" lvl="0" marL="457200" rtl="0" algn="l">
+              <a:spcBef>
+                <a:spcPts val="1000"/>
+              </a:spcBef>
+              <a:spcAft>
+                <a:spcPts val="0"/>
+              </a:spcAft>
+              <a:buSzPts val="1800"/>
+              <a:buAutoNum type="arabicPeriod"/>
+            </a:pPr>
+            <a:r>
+              <a:rPr lang="en"/>
+              <a:t>Exercise (team meetings)</a:t>
+            </a:r>
+            <a:endParaRPr/>
+          </a:p>
+          <a:p>
+            <a:pPr indent="-317500" lvl="1" marL="914400" rtl="0" algn="l">
+              <a:spcBef>
+                <a:spcPts val="0"/>
+              </a:spcBef>
+              <a:spcAft>
+                <a:spcPts val="0"/>
+              </a:spcAft>
+              <a:buSzPts val="1400"/>
+              <a:buChar char="○"/>
+            </a:pPr>
+            <a:r>
+              <a:rPr lang="en"/>
+              <a:t>AMOS team meeting</a:t>
+            </a:r>
+            <a:endParaRPr/>
+          </a:p>
+          <a:p>
+            <a:pPr indent="-342900" lvl="0" marL="457200" rtl="0" algn="l">
+              <a:spcBef>
+                <a:spcPts val="1000"/>
+              </a:spcBef>
+              <a:spcAft>
+                <a:spcPts val="0"/>
+              </a:spcAft>
+              <a:buSzPts val="1800"/>
+              <a:buAutoNum type="arabicPeriod"/>
+            </a:pPr>
+            <a:r>
+              <a:rPr lang="en"/>
+              <a:t>Homework (self-organized)</a:t>
+            </a:r>
+            <a:endParaRPr/>
+          </a:p>
+          <a:p>
+            <a:pPr indent="-317500" lvl="1" marL="914400" rtl="0" algn="l">
+              <a:spcBef>
+                <a:spcPts val="0"/>
+              </a:spcBef>
+              <a:spcAft>
+                <a:spcPts val="0"/>
+              </a:spcAft>
+              <a:buSzPts val="1400"/>
+              <a:buChar char="○"/>
+            </a:pPr>
+            <a:r>
+              <a:rPr lang="en"/>
+              <a:t>See Course Organization doc</a:t>
+            </a:r>
+            <a:endParaRPr/>
+          </a:p>
+          <a:p>
+            <a:pPr indent="0" lvl="0" marL="0" rtl="0" algn="l">
+              <a:spcBef>
+                <a:spcPts val="1200"/>
+              </a:spcBef>
+              <a:spcAft>
+                <a:spcPts val="1200"/>
+              </a:spcAft>
+              <a:buNone/>
+            </a:pPr>
+            <a:r>
+              <a:t/>
+            </a:r>
+            <a:endParaRPr/>
+          </a:p>
+        </p:txBody>
+      </p:sp>
+    </p:spTree>
+  </p:cSld>
+  <p:clrMapOvr>
+    <a:masterClrMapping/>
+  </p:clrMapOvr>
+</p:sld>
+</file>
+
+<file path=ppt/slides/slide17.xml><?xml version="1.0" encoding="utf-8"?>
+<p:sld xmlns:a="http://schemas.openxmlformats.org/drawingml/2006/main" xmlns:r="http://schemas.openxmlformats.org/officeDocument/2006/relationships" xmlns:mc="http://schemas.openxmlformats.org/markup-compatibility/2006" xmlns:mv="urn:schemas-microsoft-com:mac:vml" xmlns:p="http://schemas.openxmlformats.org/presentationml/2006/main" xmlns:c="http://schemas.openxmlformats.org/drawingml/2006/chart" xmlns:dgm="http://schemas.openxmlformats.org/drawingml/2006/diagram" xmlns:o="urn:schemas-microsoft-com:office:office" xmlns:v="urn:schemas-microsoft-com:vml" xmlns:pvml="urn:schemas-microsoft-com:office:powerpoint" xmlns:com="http://schemas.openxmlformats.org/drawingml/2006/compatibility" xmlns:p14="http://schemas.microsoft.com/office/powerpoint/2010/main" xmlns:p15="http://schemas.microsoft.com/office/powerpoint/2012/main" xmlns:ahyp="http://schemas.microsoft.com/office/drawing/2018/hyperlinkcolor">
+  <p:cSld>
+    <p:spTree>
+      <p:nvGrpSpPr>
+        <p:cNvPr id="148" name="Shape 148"/>
+        <p:cNvGrpSpPr/>
+        <p:nvPr/>
+      </p:nvGrpSpPr>
+      <p:grpSpPr>
+        <a:xfrm>
+          <a:off x="0" y="0"/>
+          <a:ext cx="0" cy="0"/>
+          <a:chOff x="0" y="0"/>
+          <a:chExt cx="0" cy="0"/>
+        </a:xfrm>
+      </p:grpSpPr>
+      <p:sp>
+        <p:nvSpPr>
+          <p:cNvPr id="149" name="Google Shape;149;p24"/>
+          <p:cNvSpPr txBox="1"/>
+          <p:nvPr>
+            <p:ph type="title"/>
+          </p:nvPr>
+        </p:nvSpPr>
+        <p:spPr>
+          <a:xfrm>
+            <a:off x="0" y="0"/>
+            <a:ext cx="9144000" cy="685800"/>
+          </a:xfrm>
+          <a:prstGeom prst="rect">
+            <a:avLst/>
+          </a:prstGeom>
+        </p:spPr>
+        <p:txBody>
+          <a:bodyPr anchorCtr="0" anchor="ctr" bIns="91425" lIns="274300" spcFirstLastPara="1" rIns="91425" wrap="square" tIns="91425">
+            <a:noAutofit/>
+          </a:bodyPr>
+          <a:lstStyle/>
+          <a:p>
+            <a:pPr indent="0" lvl="0" marL="0" rtl="0" algn="l">
+              <a:spcBef>
+                <a:spcPts val="0"/>
+              </a:spcBef>
+              <a:spcAft>
+                <a:spcPts val="0"/>
+              </a:spcAft>
+              <a:buNone/>
+            </a:pPr>
+            <a:r>
+              <a:rPr lang="en"/>
+              <a:t>Course Communication</a:t>
+            </a:r>
+            <a:endParaRPr/>
+          </a:p>
+        </p:txBody>
+      </p:sp>
+      <p:sp>
+        <p:nvSpPr>
+          <p:cNvPr id="150" name="Google Shape;150;p24"/>
+          <p:cNvSpPr txBox="1"/>
+          <p:nvPr>
+            <p:ph idx="1" type="body"/>
+          </p:nvPr>
+        </p:nvSpPr>
+        <p:spPr>
+          <a:xfrm>
+            <a:off x="274320" y="914400"/>
+            <a:ext cx="8595300" cy="4114800"/>
+          </a:xfrm>
+          <a:prstGeom prst="rect">
+            <a:avLst/>
+          </a:prstGeom>
+        </p:spPr>
+        <p:txBody>
+          <a:bodyPr anchorCtr="0" anchor="t" bIns="0" lIns="0" spcFirstLastPara="1" rIns="0" wrap="square" tIns="0">
+            <a:noAutofit/>
+          </a:bodyPr>
+          <a:lstStyle/>
+          <a:p>
+            <a:pPr indent="0" lvl="0" marL="0" rtl="0" algn="l">
+              <a:spcBef>
+                <a:spcPts val="0"/>
+              </a:spcBef>
+              <a:spcAft>
+                <a:spcPts val="0"/>
+              </a:spcAft>
+              <a:buNone/>
+            </a:pPr>
+            <a:r>
+              <a:rPr lang="en"/>
+              <a:t>Announcements are sent by email</a:t>
+            </a:r>
+            <a:endParaRPr/>
+          </a:p>
+          <a:p>
+            <a:pPr indent="-342900" lvl="0" marL="457200" rtl="0" algn="l">
+              <a:spcBef>
+                <a:spcPts val="1200"/>
+              </a:spcBef>
+              <a:spcAft>
+                <a:spcPts val="0"/>
+              </a:spcAft>
+              <a:buSzPts val="1800"/>
+              <a:buChar char="●"/>
+            </a:pPr>
+            <a:r>
+              <a:rPr lang="en"/>
+              <a:t>Through email aliases</a:t>
+            </a:r>
+            <a:endParaRPr/>
+          </a:p>
+          <a:p>
+            <a:pPr indent="-342900" lvl="0" marL="457200" rtl="0" algn="l">
+              <a:spcBef>
+                <a:spcPts val="0"/>
+              </a:spcBef>
+              <a:spcAft>
+                <a:spcPts val="0"/>
+              </a:spcAft>
+              <a:buSzPts val="1800"/>
+              <a:buChar char="●"/>
+            </a:pPr>
+            <a:r>
+              <a:rPr lang="en"/>
+              <a:t>Through course management system</a:t>
+            </a:r>
+            <a:endParaRPr/>
+          </a:p>
+          <a:p>
+            <a:pPr indent="0" lvl="0" marL="0" rtl="0" algn="l">
+              <a:spcBef>
+                <a:spcPts val="1200"/>
+              </a:spcBef>
+              <a:spcAft>
+                <a:spcPts val="0"/>
+              </a:spcAft>
+              <a:buNone/>
+            </a:pPr>
+            <a:r>
+              <a:rPr lang="en"/>
+              <a:t>Administrative questions to teaching team</a:t>
+            </a:r>
+            <a:endParaRPr/>
+          </a:p>
+          <a:p>
+            <a:pPr indent="-342900" lvl="0" marL="457200" rtl="0" algn="l">
+              <a:spcBef>
+                <a:spcPts val="1200"/>
+              </a:spcBef>
+              <a:spcAft>
+                <a:spcPts val="0"/>
+              </a:spcAft>
+              <a:buSzPts val="1800"/>
+              <a:buChar char="●"/>
+            </a:pPr>
+            <a:r>
+              <a:rPr lang="en"/>
+              <a:t>Please ask your question in the COACH backchannel</a:t>
+            </a:r>
+            <a:endParaRPr/>
+          </a:p>
+          <a:p>
+            <a:pPr indent="-342900" lvl="0" marL="457200" rtl="0" algn="l">
+              <a:spcBef>
+                <a:spcPts val="0"/>
+              </a:spcBef>
+              <a:spcAft>
+                <a:spcPts val="0"/>
+              </a:spcAft>
+              <a:buSzPts val="1800"/>
+              <a:buChar char="●"/>
+            </a:pPr>
+            <a:r>
+              <a:rPr lang="en"/>
+              <a:t>For private questions, use the teaching team email alias</a:t>
+            </a:r>
+            <a:endParaRPr/>
+          </a:p>
+        </p:txBody>
+      </p:sp>
+      <p:sp>
+        <p:nvSpPr>
+          <p:cNvPr id="151" name="Google Shape;151;p24"/>
+          <p:cNvSpPr txBox="1"/>
+          <p:nvPr>
+            <p:ph idx="12" type="sldNum"/>
+          </p:nvPr>
+        </p:nvSpPr>
+        <p:spPr>
+          <a:xfrm>
+            <a:off x="7315202" y="4416550"/>
+            <a:ext cx="1828800" cy="731400"/>
+          </a:xfrm>
+          <a:prstGeom prst="rect">
+            <a:avLst/>
+          </a:prstGeom>
+        </p:spPr>
+        <p:txBody>
+          <a:bodyPr anchorCtr="0" anchor="b" bIns="91425" lIns="91425" spcFirstLastPara="1" rIns="91425" wrap="square" tIns="91425">
+            <a:noAutofit/>
+          </a:bodyPr>
+          <a:lstStyle/>
+          <a:p>
+            <a:pPr indent="0" lvl="0" marL="0" rtl="0" algn="r">
+              <a:spcBef>
+                <a:spcPts val="0"/>
+              </a:spcBef>
+              <a:spcAft>
+                <a:spcPts val="0"/>
+              </a:spcAft>
+              <a:buNone/>
+            </a:pPr>
+            <a:fld id="{00000000-1234-1234-1234-123412341234}" type="slidenum">
+              <a:rPr lang="en"/>
+              <a:t>‹#›</a:t>
+            </a:fld>
+            <a:endParaRPr/>
+          </a:p>
+          <a:p>
+            <a:pPr indent="0" lvl="0" marL="0" rtl="0" algn="r">
+              <a:spcBef>
+                <a:spcPts val="0"/>
+              </a:spcBef>
+              <a:spcAft>
+                <a:spcPts val="0"/>
+              </a:spcAft>
+              <a:buNone/>
+            </a:pPr>
+            <a:r>
+              <a:rPr b="0" lang="en" sz="900" u="sng">
+                <a:solidFill>
+                  <a:schemeClr val="hlink"/>
+                </a:solidFill>
+                <a:hlinkClick r:id="rId3"/>
+              </a:rPr>
+              <a:t>https://profriehle.com</a:t>
+            </a:r>
+            <a:r>
+              <a:rPr b="0" lang="en" sz="900">
+                <a:solidFill>
+                  <a:schemeClr val="dk2"/>
+                </a:solidFill>
+              </a:rPr>
+              <a:t> </a:t>
+            </a:r>
+            <a:endParaRPr/>
+          </a:p>
+        </p:txBody>
+      </p:sp>
+    </p:spTree>
+  </p:cSld>
+  <p:clrMapOvr>
+    <a:masterClrMapping/>
+  </p:clrMapOvr>
+</p:sld>
+</file>
+
+<file path=ppt/slides/slide18.xml><?xml version="1.0" encoding="utf-8"?>
+<p:sld xmlns:a="http://schemas.openxmlformats.org/drawingml/2006/main" xmlns:r="http://schemas.openxmlformats.org/officeDocument/2006/relationships" xmlns:mc="http://schemas.openxmlformats.org/markup-compatibility/2006" xmlns:mv="urn:schemas-microsoft-com:mac:vml" xmlns:p="http://schemas.openxmlformats.org/presentationml/2006/main" xmlns:c="http://schemas.openxmlformats.org/drawingml/2006/chart" xmlns:dgm="http://schemas.openxmlformats.org/drawingml/2006/diagram" xmlns:o="urn:schemas-microsoft-com:office:office" xmlns:v="urn:schemas-microsoft-com:vml" xmlns:pvml="urn:schemas-microsoft-com:office:powerpoint" xmlns:com="http://schemas.openxmlformats.org/drawingml/2006/compatibility" xmlns:p14="http://schemas.microsoft.com/office/powerpoint/2010/main" xmlns:p15="http://schemas.microsoft.com/office/powerpoint/2012/main" xmlns:ahyp="http://schemas.microsoft.com/office/drawing/2018/hyperlinkcolor">
+  <p:cSld>
+    <p:spTree>
+      <p:nvGrpSpPr>
+        <p:cNvPr id="155" name="Shape 155"/>
+        <p:cNvGrpSpPr/>
+        <p:nvPr/>
+      </p:nvGrpSpPr>
+      <p:grpSpPr>
+        <a:xfrm>
+          <a:off x="0" y="0"/>
+          <a:ext cx="0" cy="0"/>
+          <a:chOff x="0" y="0"/>
+          <a:chExt cx="0" cy="0"/>
+        </a:xfrm>
+      </p:grpSpPr>
+      <p:sp>
+        <p:nvSpPr>
+          <p:cNvPr id="156" name="Google Shape;156;p25"/>
+          <p:cNvSpPr txBox="1"/>
+          <p:nvPr>
             <p:ph type="ctrTitle"/>
           </p:nvPr>
         </p:nvSpPr>
@@ -7452,7 +8109,7 @@
       </p:sp>
       <p:sp>
         <p:nvSpPr>
-          <p:cNvPr id="143" name="Google Shape;143;p23"/>
+          <p:cNvPr id="157" name="Google Shape;157;p25"/>
           <p:cNvSpPr txBox="1"/>
           <p:nvPr>
             <p:ph idx="1" type="subTitle"/>
@@ -7577,12 +8234,12 @@
 </p:sld>
 </file>
 
-<file path=ppt/slides/slide17.xml><?xml version="1.0" encoding="utf-8"?>
+<file path=ppt/slides/slide19.xml><?xml version="1.0" encoding="utf-8"?>
 <p:sld xmlns:a="http://schemas.openxmlformats.org/drawingml/2006/main" xmlns:r="http://schemas.openxmlformats.org/officeDocument/2006/relationships" xmlns:mc="http://schemas.openxmlformats.org/markup-compatibility/2006" xmlns:mv="urn:schemas-microsoft-com:mac:vml" xmlns:p="http://schemas.openxmlformats.org/presentationml/2006/main" xmlns:c="http://schemas.openxmlformats.org/drawingml/2006/chart" xmlns:dgm="http://schemas.openxmlformats.org/drawingml/2006/diagram" xmlns:o="urn:schemas-microsoft-com:office:office" xmlns:v="urn:schemas-microsoft-com:vml" xmlns:pvml="urn:schemas-microsoft-com:office:powerpoint" xmlns:com="http://schemas.openxmlformats.org/drawingml/2006/compatibility" xmlns:p14="http://schemas.microsoft.com/office/powerpoint/2010/main" xmlns:p15="http://schemas.microsoft.com/office/powerpoint/2012/main" xmlns:ahyp="http://schemas.microsoft.com/office/drawing/2018/hyperlinkcolor">
   <p:cSld>
     <p:spTree>
       <p:nvGrpSpPr>
-        <p:cNvPr id="147" name="Shape 147"/>
+        <p:cNvPr id="161" name="Shape 161"/>
         <p:cNvGrpSpPr/>
         <p:nvPr/>
       </p:nvGrpSpPr>
@@ -7596,7 +8253,7 @@
       </p:grpSpPr>
       <p:sp>
         <p:nvSpPr>
-          <p:cNvPr id="148" name="Google Shape;148;p24"/>
+          <p:cNvPr id="162" name="Google Shape;162;p26"/>
           <p:cNvSpPr txBox="1"/>
           <p:nvPr>
             <p:ph type="title"/>
@@ -7636,7 +8293,7 @@
       </p:sp>
       <p:sp>
         <p:nvSpPr>
-          <p:cNvPr id="149" name="Google Shape;149;p24"/>
+          <p:cNvPr id="163" name="Google Shape;163;p26"/>
           <p:cNvSpPr txBox="1"/>
           <p:nvPr>
             <p:ph idx="12" type="sldNum"/>
@@ -7705,7 +8362,7 @@
       </p:sp>
       <p:sp>
         <p:nvSpPr>
-          <p:cNvPr id="150" name="Google Shape;150;p24"/>
+          <p:cNvPr id="164" name="Google Shape;164;p26"/>
           <p:cNvSpPr txBox="1"/>
           <p:nvPr>
             <p:ph idx="1" type="body"/>
@@ -7919,10 +8576,10 @@
               <a:buNone/>
             </a:pPr>
             <a:r>
-              <a:rPr b="1" lang="en"/>
+              <a:rPr lang="en"/>
               <a:t>Learning objectives</a:t>
             </a:r>
-            <a:endParaRPr b="1"/>
+            <a:endParaRPr/>
           </a:p>
           <a:p>
             <a:pPr indent="-342900" lvl="0" marL="457200" rtl="0" algn="l">
@@ -8003,10 +8660,10 @@
               <a:buNone/>
             </a:pPr>
             <a:r>
-              <a:rPr b="1" lang="en"/>
+              <a:rPr lang="en"/>
               <a:t>Project objectives</a:t>
             </a:r>
-            <a:endParaRPr b="1"/>
+            <a:endParaRPr/>
           </a:p>
           <a:p>
             <a:pPr indent="-342900" lvl="0" marL="457200" rtl="0" algn="l">
@@ -8198,10 +8855,10 @@
               <a:buNone/>
             </a:pPr>
             <a:r>
-              <a:rPr b="1" lang="en"/>
+              <a:rPr lang="en"/>
               <a:t>Prerequisites</a:t>
             </a:r>
-            <a:endParaRPr b="1"/>
+            <a:endParaRPr/>
           </a:p>
           <a:p>
             <a:pPr indent="-342900" lvl="0" marL="457200" rtl="0" algn="l">
@@ -8231,10 +8888,10 @@
               <a:buNone/>
             </a:pPr>
             <a:r>
-              <a:rPr b="1" lang="en"/>
+              <a:rPr lang="en"/>
               <a:t>Required skills</a:t>
             </a:r>
-            <a:endParaRPr b="1"/>
+            <a:endParaRPr/>
           </a:p>
           <a:p>
             <a:pPr indent="-342900" lvl="0" marL="457200" rtl="0" algn="l">
@@ -8249,7 +8906,7 @@
             </a:pPr>
             <a:r>
               <a:rPr lang="en"/>
-              <a:t>Willingness to apply social competence in project setting</a:t>
+              <a:t>Willingness to apply social competence in project</a:t>
             </a:r>
             <a:endParaRPr/>
           </a:p>
@@ -8288,6 +8945,23 @@
             <a:endParaRPr/>
           </a:p>
           <a:p>
+            <a:pPr indent="-342900" lvl="0" marL="457200" rtl="0" algn="l">
+              <a:spcBef>
+                <a:spcPts val="0"/>
+              </a:spcBef>
+              <a:spcAft>
+                <a:spcPts val="0"/>
+              </a:spcAft>
+              <a:buSzPts val="1800"/>
+              <a:buChar char="●"/>
+            </a:pPr>
+            <a:r>
+              <a:rPr lang="en"/>
+              <a:t>Ability to be hands-on if necessary</a:t>
+            </a:r>
+            <a:endParaRPr/>
+          </a:p>
+          <a:p>
             <a:pPr indent="0" lvl="0" marL="0" rtl="0" algn="l">
               <a:spcBef>
                 <a:spcPts val="1200"/>
@@ -8298,7 +8972,8 @@
               <a:buNone/>
             </a:pPr>
             <a:r>
-              <a:t/>
+              <a:rPr lang="en"/>
+              <a:t>Be a servant-leader</a:t>
             </a:r>
             <a:endParaRPr/>
           </a:p>
@@ -8684,7 +9359,7 @@
             <a:tbl>
               <a:tblPr>
                 <a:noFill/>
-                <a:tableStyleId>{20C968D8-F1F3-48B6-8BCA-3403E9FF8CDB}</a:tableStyleId>
+                <a:tableStyleId>{FC6A0DF2-C06D-4A33-A880-A92D56615C44}</a:tableStyleId>
               </a:tblPr>
               <a:tblGrid>
                 <a:gridCol w="1432575"/>
@@ -8774,14 +9449,14 @@
                         <a:buNone/>
                       </a:pPr>
                       <a:r>
-                        <a:rPr b="1" lang="en" sz="1800">
+                        <a:rPr b="1" lang="en">
                           <a:solidFill>
                             <a:schemeClr val="lt1"/>
                           </a:solidFill>
                         </a:rPr>
                         <a:t>Courses (Lehrveranstaltungen)</a:t>
                       </a:r>
-                      <a:endParaRPr b="1" sz="1800">
+                      <a:endParaRPr b="1">
                         <a:solidFill>
                           <a:schemeClr val="lt1"/>
                         </a:solidFill>
@@ -9177,14 +9852,14 @@
                         <a:buNone/>
                       </a:pPr>
                       <a:r>
-                        <a:rPr b="1" lang="en" sz="1800">
+                        <a:rPr b="1" lang="en">
                           <a:solidFill>
                             <a:schemeClr val="lt1"/>
                           </a:solidFill>
                         </a:rPr>
                         <a:t>Modules</a:t>
                       </a:r>
-                      <a:endParaRPr b="1" sz="1800">
+                      <a:endParaRPr b="1">
                         <a:solidFill>
                           <a:schemeClr val="lt1"/>
                         </a:solidFill>
@@ -10567,7 +11242,7 @@
             <a:tbl>
               <a:tblPr>
                 <a:noFill/>
-                <a:tableStyleId>{20C968D8-F1F3-48B6-8BCA-3403E9FF8CDB}</a:tableStyleId>
+                <a:tableStyleId>{FC6A0DF2-C06D-4A33-A880-A92D56615C44}</a:tableStyleId>
               </a:tblPr>
               <a:tblGrid>
                 <a:gridCol w="1432550"/>
@@ -10711,14 +11386,14 @@
                         <a:buNone/>
                       </a:pPr>
                       <a:r>
-                        <a:rPr b="1" lang="en" sz="1800">
+                        <a:rPr b="1" lang="en">
                           <a:solidFill>
                             <a:schemeClr val="lt1"/>
                           </a:solidFill>
                         </a:rPr>
                         <a:t>University</a:t>
                       </a:r>
-                      <a:endParaRPr b="1" sz="1800">
+                      <a:endParaRPr b="1">
                         <a:solidFill>
                           <a:schemeClr val="lt1"/>
                         </a:solidFill>
@@ -10910,7 +11585,15 @@
                             <a:schemeClr val="lt1"/>
                           </a:solidFill>
                         </a:rPr>
-                        <a:t>Univ. Erlangen</a:t>
+                        <a:t>FAU</a:t>
+                      </a:r>
+                      <a:r>
+                        <a:rPr b="1" lang="en">
+                          <a:solidFill>
+                            <a:schemeClr val="lt1"/>
+                          </a:solidFill>
+                        </a:rPr>
+                        <a:t> Erlangen</a:t>
                       </a:r>
                       <a:endParaRPr b="1">
                         <a:solidFill>
@@ -11186,14 +11869,14 @@
                         <a:buNone/>
                       </a:pPr>
                       <a:r>
-                        <a:rPr b="1" lang="en" sz="1800">
+                        <a:rPr b="1" lang="en">
                           <a:solidFill>
                             <a:schemeClr val="lt1"/>
                           </a:solidFill>
                         </a:rPr>
                         <a:t>Modules</a:t>
                       </a:r>
-                      <a:endParaRPr b="1" sz="1800">
+                      <a:endParaRPr b="1">
                         <a:solidFill>
                           <a:schemeClr val="lt1"/>
                         </a:solidFill>
@@ -12927,6 +13610,46 @@
           <p:cNvPr id="85" name="Google Shape;85;p15"/>
           <p:cNvSpPr txBox="1"/>
           <p:nvPr>
+            <p:ph type="title"/>
+          </p:nvPr>
+        </p:nvSpPr>
+        <p:spPr>
+          <a:xfrm>
+            <a:off x="0" y="0"/>
+            <a:ext cx="9144000" cy="685800"/>
+          </a:xfrm>
+          <a:prstGeom prst="rect">
+            <a:avLst/>
+          </a:prstGeom>
+        </p:spPr>
+        <p:txBody>
+          <a:bodyPr anchorCtr="0" anchor="ctr" bIns="91425" lIns="274300" spcFirstLastPara="1" rIns="91425" wrap="square" tIns="91425">
+            <a:noAutofit/>
+          </a:bodyPr>
+          <a:lstStyle/>
+          <a:p>
+            <a:pPr indent="0" lvl="0" marL="0" rtl="0" algn="l">
+              <a:spcBef>
+                <a:spcPts val="0"/>
+              </a:spcBef>
+              <a:spcAft>
+                <a:spcPts val="0"/>
+              </a:spcAft>
+              <a:buNone/>
+            </a:pPr>
+            <a:r>
+              <a:rPr lang="en"/>
+              <a:t>Holding Your Workshop</a:t>
+            </a:r>
+            <a:endParaRPr/>
+          </a:p>
+        </p:txBody>
+      </p:sp>
+      <p:sp>
+        <p:nvSpPr>
+          <p:cNvPr id="86" name="Google Shape;86;p15"/>
+          <p:cNvSpPr txBox="1"/>
+          <p:nvPr>
             <p:ph idx="1" type="body"/>
           </p:nvPr>
         </p:nvSpPr>
@@ -12955,12 +13678,8 @@
               <a:buNone/>
             </a:pPr>
             <a:r>
-              <a:rPr b="1" lang="en"/>
-              <a:t>Scrum Master</a:t>
-            </a:r>
-            <a:r>
               <a:rPr lang="en"/>
-              <a:t> = 50% of grade</a:t>
+              <a:t>The workshop date is set in the AMOS course schedule</a:t>
             </a:r>
             <a:endParaRPr/>
           </a:p>
@@ -12977,218 +13696,23 @@
             </a:pPr>
             <a:r>
               <a:rPr lang="en"/>
-              <a:t>Individual contribution to teamwork = 50%</a:t>
-            </a:r>
-            <a:endParaRPr/>
-          </a:p>
-          <a:p>
-            <a:pPr indent="-317500" lvl="1" marL="914400" rtl="0" algn="l">
-              <a:spcBef>
-                <a:spcPts val="0"/>
-              </a:spcBef>
-              <a:spcAft>
-                <a:spcPts val="0"/>
-              </a:spcAft>
-              <a:buSzPts val="1400"/>
-              <a:buChar char="○"/>
+              <a:t>AMOS students are required to be there</a:t>
+            </a:r>
+            <a:endParaRPr/>
+          </a:p>
+          <a:p>
+            <a:pPr indent="0" lvl="0" marL="0" rtl="0" algn="l">
+              <a:spcBef>
+                <a:spcPts val="1200"/>
+              </a:spcBef>
+              <a:spcAft>
+                <a:spcPts val="1200"/>
+              </a:spcAft>
+              <a:buNone/>
             </a:pPr>
             <a:r>
               <a:rPr lang="en"/>
-              <a:t>As measured in team meetings</a:t>
-            </a:r>
-            <a:endParaRPr/>
-          </a:p>
-          <a:p>
-            <a:pPr indent="-317500" lvl="1" marL="914400" rtl="0" algn="l">
-              <a:spcBef>
-                <a:spcPts val="0"/>
-              </a:spcBef>
-              <a:spcAft>
-                <a:spcPts val="0"/>
-              </a:spcAft>
-              <a:buSzPts val="1400"/>
-              <a:buChar char="○"/>
-            </a:pPr>
-            <a:r>
-              <a:rPr lang="en"/>
-              <a:t>Grading scale is [0|1|2|3]</a:t>
-            </a:r>
-            <a:endParaRPr/>
-          </a:p>
-          <a:p>
-            <a:pPr indent="-342900" lvl="0" marL="457200" rtl="0" algn="l">
-              <a:spcBef>
-                <a:spcPts val="0"/>
-              </a:spcBef>
-              <a:spcAft>
-                <a:spcPts val="0"/>
-              </a:spcAft>
-              <a:buSzPts val="1800"/>
-              <a:buChar char="●"/>
-            </a:pPr>
-            <a:r>
-              <a:rPr lang="en"/>
-              <a:t>Independent work = 50%</a:t>
-            </a:r>
-            <a:endParaRPr/>
-          </a:p>
-          <a:p>
-            <a:pPr indent="-317500" lvl="1" marL="914400" rtl="0" algn="l">
-              <a:spcBef>
-                <a:spcPts val="0"/>
-              </a:spcBef>
-              <a:spcAft>
-                <a:spcPts val="0"/>
-              </a:spcAft>
-              <a:buSzPts val="1400"/>
-              <a:buChar char="○"/>
-            </a:pPr>
-            <a:r>
-              <a:rPr lang="en"/>
-              <a:t>As measured by artifacts provided</a:t>
-            </a:r>
-            <a:endParaRPr/>
-          </a:p>
-          <a:p>
-            <a:pPr indent="-317500" lvl="1" marL="914400" rtl="0" algn="l">
-              <a:spcBef>
-                <a:spcPts val="0"/>
-              </a:spcBef>
-              <a:spcAft>
-                <a:spcPts val="0"/>
-              </a:spcAft>
-              <a:buSzPts val="1400"/>
-              <a:buChar char="○"/>
-            </a:pPr>
-            <a:r>
-              <a:rPr lang="en"/>
-              <a:t>Grading scale is [0|1|2|3]</a:t>
-            </a:r>
-            <a:endParaRPr/>
-          </a:p>
-          <a:p>
-            <a:pPr indent="0" lvl="0" marL="0" rtl="0" algn="l">
-              <a:spcBef>
-                <a:spcPts val="1200"/>
-              </a:spcBef>
-              <a:spcAft>
-                <a:spcPts val="0"/>
-              </a:spcAft>
-              <a:buNone/>
-            </a:pPr>
-            <a:r>
-              <a:rPr b="1" lang="en"/>
-              <a:t>Workshop facilitator</a:t>
-            </a:r>
-            <a:r>
-              <a:rPr lang="en"/>
-              <a:t> = 50% of grade</a:t>
-            </a:r>
-            <a:endParaRPr/>
-          </a:p>
-          <a:p>
-            <a:pPr indent="-342900" lvl="0" marL="457200" rtl="0" algn="l">
-              <a:spcBef>
-                <a:spcPts val="1200"/>
-              </a:spcBef>
-              <a:spcAft>
-                <a:spcPts val="0"/>
-              </a:spcAft>
-              <a:buSzPts val="1800"/>
-              <a:buChar char="●"/>
-            </a:pPr>
-            <a:r>
-              <a:rPr lang="en"/>
-              <a:t>Workshop concept (40%)</a:t>
-            </a:r>
-            <a:endParaRPr/>
-          </a:p>
-          <a:p>
-            <a:pPr indent="-342900" lvl="0" marL="457200" rtl="0" algn="l">
-              <a:spcBef>
-                <a:spcPts val="0"/>
-              </a:spcBef>
-              <a:spcAft>
-                <a:spcPts val="0"/>
-              </a:spcAft>
-              <a:buSzPts val="1800"/>
-              <a:buChar char="●"/>
-            </a:pPr>
-            <a:r>
-              <a:rPr lang="en"/>
-              <a:t>Workshop feedback (20%)</a:t>
-            </a:r>
-            <a:endParaRPr/>
-          </a:p>
-          <a:p>
-            <a:pPr indent="-342900" lvl="0" marL="457200" rtl="0" algn="l">
-              <a:spcBef>
-                <a:spcPts val="0"/>
-              </a:spcBef>
-              <a:spcAft>
-                <a:spcPts val="0"/>
-              </a:spcAft>
-              <a:buSzPts val="1800"/>
-              <a:buChar char="●"/>
-            </a:pPr>
-            <a:r>
-              <a:rPr lang="en"/>
-              <a:t>Workshop report (40%)</a:t>
-            </a:r>
-            <a:endParaRPr/>
-          </a:p>
-          <a:p>
-            <a:pPr indent="0" lvl="0" marL="0" rtl="0" algn="l">
-              <a:spcBef>
-                <a:spcPts val="1200"/>
-              </a:spcBef>
-              <a:spcAft>
-                <a:spcPts val="1200"/>
-              </a:spcAft>
-              <a:buNone/>
-            </a:pPr>
-            <a:r>
-              <a:t/>
-            </a:r>
-            <a:endParaRPr/>
-          </a:p>
-        </p:txBody>
-      </p:sp>
-      <p:sp>
-        <p:nvSpPr>
-          <p:cNvPr id="86" name="Google Shape;86;p15"/>
-          <p:cNvSpPr txBox="1"/>
-          <p:nvPr>
-            <p:ph type="title"/>
-          </p:nvPr>
-        </p:nvSpPr>
-        <p:spPr>
-          <a:xfrm>
-            <a:off x="0" y="0"/>
-            <a:ext cx="9144000" cy="685800"/>
-          </a:xfrm>
-          <a:prstGeom prst="rect">
-            <a:avLst/>
-          </a:prstGeom>
-        </p:spPr>
-        <p:txBody>
-          <a:bodyPr anchorCtr="0" anchor="ctr" bIns="91425" lIns="274300" spcFirstLastPara="1" rIns="91425" wrap="square" tIns="91425">
-            <a:noAutofit/>
-          </a:bodyPr>
-          <a:lstStyle/>
-          <a:p>
-            <a:pPr indent="0" lvl="0" marL="0" rtl="0" algn="l">
-              <a:spcBef>
-                <a:spcPts val="0"/>
-              </a:spcBef>
-              <a:spcAft>
-                <a:spcPts val="0"/>
-              </a:spcAft>
-              <a:buNone/>
-            </a:pPr>
-            <a:r>
-              <a:rPr lang="en"/>
-              <a:t>Course Grading</a:t>
+              <a:t>You are responsible for reminding and managing students</a:t>
             </a:r>
             <a:endParaRPr/>
           </a:p>
@@ -13293,6 +13817,219 @@
           <p:cNvPr id="92" name="Google Shape;92;p16"/>
           <p:cNvSpPr txBox="1"/>
           <p:nvPr>
+            <p:ph idx="1" type="body"/>
+          </p:nvPr>
+        </p:nvSpPr>
+        <p:spPr>
+          <a:xfrm>
+            <a:off x="274320" y="914400"/>
+            <a:ext cx="8595300" cy="4114800"/>
+          </a:xfrm>
+          <a:prstGeom prst="rect">
+            <a:avLst/>
+          </a:prstGeom>
+        </p:spPr>
+        <p:txBody>
+          <a:bodyPr anchorCtr="0" anchor="t" bIns="0" lIns="0" spcFirstLastPara="1" rIns="0" wrap="square" tIns="0">
+            <a:noAutofit/>
+          </a:bodyPr>
+          <a:lstStyle/>
+          <a:p>
+            <a:pPr indent="0" lvl="0" marL="0" rtl="0" algn="l">
+              <a:spcBef>
+                <a:spcPts val="0"/>
+              </a:spcBef>
+              <a:spcAft>
+                <a:spcPts val="0"/>
+              </a:spcAft>
+              <a:buNone/>
+            </a:pPr>
+            <a:r>
+              <a:rPr lang="en"/>
+              <a:t>Scrum Master = 50% of grade</a:t>
+            </a:r>
+            <a:endParaRPr/>
+          </a:p>
+          <a:p>
+            <a:pPr indent="-342900" lvl="0" marL="457200" rtl="0" algn="l">
+              <a:spcBef>
+                <a:spcPts val="1200"/>
+              </a:spcBef>
+              <a:spcAft>
+                <a:spcPts val="0"/>
+              </a:spcAft>
+              <a:buSzPts val="1800"/>
+              <a:buChar char="●"/>
+            </a:pPr>
+            <a:r>
+              <a:rPr lang="en"/>
+              <a:t>Individual contribution to teamwork = 50%</a:t>
+            </a:r>
+            <a:endParaRPr/>
+          </a:p>
+          <a:p>
+            <a:pPr indent="-317500" lvl="1" marL="914400" rtl="0" algn="l">
+              <a:spcBef>
+                <a:spcPts val="0"/>
+              </a:spcBef>
+              <a:spcAft>
+                <a:spcPts val="0"/>
+              </a:spcAft>
+              <a:buSzPts val="1400"/>
+              <a:buChar char="○"/>
+            </a:pPr>
+            <a:r>
+              <a:rPr lang="en"/>
+              <a:t>As measured in team meetings</a:t>
+            </a:r>
+            <a:endParaRPr/>
+          </a:p>
+          <a:p>
+            <a:pPr indent="-317500" lvl="1" marL="914400" rtl="0" algn="l">
+              <a:spcBef>
+                <a:spcPts val="0"/>
+              </a:spcBef>
+              <a:spcAft>
+                <a:spcPts val="0"/>
+              </a:spcAft>
+              <a:buSzPts val="1400"/>
+              <a:buChar char="○"/>
+            </a:pPr>
+            <a:r>
+              <a:rPr lang="en"/>
+              <a:t>Grading scale is [0|1|2|3]</a:t>
+            </a:r>
+            <a:endParaRPr/>
+          </a:p>
+          <a:p>
+            <a:pPr indent="-342900" lvl="0" marL="457200" rtl="0" algn="l">
+              <a:spcBef>
+                <a:spcPts val="1000"/>
+              </a:spcBef>
+              <a:spcAft>
+                <a:spcPts val="0"/>
+              </a:spcAft>
+              <a:buSzPts val="1800"/>
+              <a:buChar char="●"/>
+            </a:pPr>
+            <a:r>
+              <a:rPr lang="en"/>
+              <a:t>Independent work = 50%</a:t>
+            </a:r>
+            <a:endParaRPr/>
+          </a:p>
+          <a:p>
+            <a:pPr indent="-317500" lvl="1" marL="914400" rtl="0" algn="l">
+              <a:spcBef>
+                <a:spcPts val="0"/>
+              </a:spcBef>
+              <a:spcAft>
+                <a:spcPts val="0"/>
+              </a:spcAft>
+              <a:buSzPts val="1400"/>
+              <a:buChar char="○"/>
+            </a:pPr>
+            <a:r>
+              <a:rPr lang="en"/>
+              <a:t>As measured by artifacts provided</a:t>
+            </a:r>
+            <a:endParaRPr/>
+          </a:p>
+          <a:p>
+            <a:pPr indent="-317500" lvl="1" marL="914400" rtl="0" algn="l">
+              <a:spcBef>
+                <a:spcPts val="0"/>
+              </a:spcBef>
+              <a:spcAft>
+                <a:spcPts val="0"/>
+              </a:spcAft>
+              <a:buSzPts val="1400"/>
+              <a:buChar char="○"/>
+            </a:pPr>
+            <a:r>
+              <a:rPr lang="en"/>
+              <a:t>Grading scale is [0|1|2|3]</a:t>
+            </a:r>
+            <a:endParaRPr/>
+          </a:p>
+          <a:p>
+            <a:pPr indent="0" lvl="0" marL="0" rtl="0" algn="l">
+              <a:spcBef>
+                <a:spcPts val="1200"/>
+              </a:spcBef>
+              <a:spcAft>
+                <a:spcPts val="0"/>
+              </a:spcAft>
+              <a:buNone/>
+            </a:pPr>
+            <a:r>
+              <a:rPr lang="en"/>
+              <a:t>Workshop facilitator</a:t>
+            </a:r>
+            <a:r>
+              <a:rPr lang="en"/>
+              <a:t> = 50% of grade</a:t>
+            </a:r>
+            <a:endParaRPr/>
+          </a:p>
+          <a:p>
+            <a:pPr indent="-342900" lvl="0" marL="457200" rtl="0" algn="l">
+              <a:spcBef>
+                <a:spcPts val="1200"/>
+              </a:spcBef>
+              <a:spcAft>
+                <a:spcPts val="0"/>
+              </a:spcAft>
+              <a:buSzPts val="1800"/>
+              <a:buChar char="●"/>
+            </a:pPr>
+            <a:r>
+              <a:rPr lang="en"/>
+              <a:t>Workshop concept (40%)</a:t>
+            </a:r>
+            <a:endParaRPr/>
+          </a:p>
+          <a:p>
+            <a:pPr indent="-342900" lvl="0" marL="457200" rtl="0" algn="l">
+              <a:spcBef>
+                <a:spcPts val="0"/>
+              </a:spcBef>
+              <a:spcAft>
+                <a:spcPts val="0"/>
+              </a:spcAft>
+              <a:buSzPts val="1800"/>
+              <a:buChar char="●"/>
+            </a:pPr>
+            <a:r>
+              <a:rPr lang="en"/>
+              <a:t>Workshop feedback (20%)</a:t>
+            </a:r>
+            <a:endParaRPr/>
+          </a:p>
+          <a:p>
+            <a:pPr indent="-342900" lvl="0" marL="457200" rtl="0" algn="l">
+              <a:spcBef>
+                <a:spcPts val="0"/>
+              </a:spcBef>
+              <a:spcAft>
+                <a:spcPts val="0"/>
+              </a:spcAft>
+              <a:buSzPts val="1800"/>
+              <a:buChar char="●"/>
+            </a:pPr>
+            <a:r>
+              <a:rPr lang="en"/>
+              <a:t>Workshop report (40%)</a:t>
+            </a:r>
+            <a:endParaRPr/>
+          </a:p>
+        </p:txBody>
+      </p:sp>
+      <p:sp>
+        <p:nvSpPr>
+          <p:cNvPr id="93" name="Google Shape;93;p16"/>
+          <p:cNvSpPr txBox="1"/>
+          <p:nvPr>
             <p:ph type="title"/>
           </p:nvPr>
         </p:nvSpPr>
@@ -13322,175 +14059,7 @@
             </a:pPr>
             <a:r>
               <a:rPr lang="en"/>
-              <a:t>Receiving a Grade for the Course</a:t>
-            </a:r>
-            <a:endParaRPr/>
-          </a:p>
-        </p:txBody>
-      </p:sp>
-      <p:sp>
-        <p:nvSpPr>
-          <p:cNvPr id="93" name="Google Shape;93;p16"/>
-          <p:cNvSpPr txBox="1"/>
-          <p:nvPr>
-            <p:ph idx="1" type="body"/>
-          </p:nvPr>
-        </p:nvSpPr>
-        <p:spPr>
-          <a:xfrm>
-            <a:off x="274320" y="914400"/>
-            <a:ext cx="8595300" cy="4114800"/>
-          </a:xfrm>
-          <a:prstGeom prst="rect">
-            <a:avLst/>
-          </a:prstGeom>
-        </p:spPr>
-        <p:txBody>
-          <a:bodyPr anchorCtr="0" anchor="t" bIns="0" lIns="0" spcFirstLastPara="1" rIns="0" wrap="square" tIns="0">
-            <a:noAutofit/>
-          </a:bodyPr>
-          <a:lstStyle/>
-          <a:p>
-            <a:pPr indent="0" lvl="0" marL="0" rtl="0" algn="l">
-              <a:spcBef>
-                <a:spcPts val="0"/>
-              </a:spcBef>
-              <a:spcAft>
-                <a:spcPts val="0"/>
-              </a:spcAft>
-              <a:buClr>
-                <a:schemeClr val="dk1"/>
-              </a:buClr>
-              <a:buSzPts val="1100"/>
-              <a:buFont typeface="Arial"/>
-              <a:buNone/>
-            </a:pPr>
-            <a:r>
-              <a:rPr lang="en"/>
-              <a:t>Course registration and exam registration are two separate things</a:t>
-            </a:r>
-            <a:endParaRPr/>
-          </a:p>
-          <a:p>
-            <a:pPr indent="0" lvl="0" marL="0" rtl="0" algn="l">
-              <a:spcBef>
-                <a:spcPts val="1200"/>
-              </a:spcBef>
-              <a:spcAft>
-                <a:spcPts val="0"/>
-              </a:spcAft>
-              <a:buClr>
-                <a:schemeClr val="dk1"/>
-              </a:buClr>
-              <a:buSzPts val="1100"/>
-              <a:buFont typeface="Arial"/>
-              <a:buNone/>
-            </a:pPr>
-            <a:r>
-              <a:rPr lang="en"/>
-              <a:t>If you want to receive a grade</a:t>
-            </a:r>
-            <a:endParaRPr/>
-          </a:p>
-          <a:p>
-            <a:pPr indent="-342900" lvl="0" marL="457200" rtl="0" algn="l">
-              <a:spcBef>
-                <a:spcPts val="1200"/>
-              </a:spcBef>
-              <a:spcAft>
-                <a:spcPts val="0"/>
-              </a:spcAft>
-              <a:buClr>
-                <a:srgbClr val="212121"/>
-              </a:buClr>
-              <a:buSzPts val="1800"/>
-              <a:buChar char="●"/>
-            </a:pPr>
-            <a:r>
-              <a:rPr lang="en">
-                <a:solidFill>
-                  <a:srgbClr val="212121"/>
-                </a:solidFill>
-              </a:rPr>
-              <a:t>You must register through your university’s exam registration system</a:t>
-            </a:r>
-            <a:endParaRPr>
-              <a:solidFill>
-                <a:srgbClr val="212121"/>
-              </a:solidFill>
-            </a:endParaRPr>
-          </a:p>
-          <a:p>
-            <a:pPr indent="-317500" lvl="1" marL="914400" rtl="0" algn="l">
-              <a:spcBef>
-                <a:spcPts val="0"/>
-              </a:spcBef>
-              <a:spcAft>
-                <a:spcPts val="0"/>
-              </a:spcAft>
-              <a:buSzPts val="1400"/>
-              <a:buChar char="○"/>
-            </a:pPr>
-            <a:r>
-              <a:rPr b="1" lang="en"/>
-              <a:t>Your degree program may have split the course into two (VL + UE)</a:t>
-            </a:r>
-            <a:endParaRPr b="1"/>
-          </a:p>
-          <a:p>
-            <a:pPr indent="-317500" lvl="1" marL="914400" rtl="0" algn="l">
-              <a:spcBef>
-                <a:spcPts val="0"/>
-              </a:spcBef>
-              <a:spcAft>
-                <a:spcPts val="0"/>
-              </a:spcAft>
-              <a:buSzPts val="1400"/>
-              <a:buChar char="○"/>
-            </a:pPr>
-            <a:r>
-              <a:rPr b="1" lang="en"/>
-              <a:t>Please check asap that the course is available in your degree program!</a:t>
-            </a:r>
-            <a:endParaRPr b="1">
-              <a:solidFill>
-                <a:srgbClr val="212121"/>
-              </a:solidFill>
-            </a:endParaRPr>
-          </a:p>
-          <a:p>
-            <a:pPr indent="0" lvl="0" marL="0" rtl="0" algn="l">
-              <a:spcBef>
-                <a:spcPts val="1200"/>
-              </a:spcBef>
-              <a:spcAft>
-                <a:spcPts val="0"/>
-              </a:spcAft>
-              <a:buClr>
-                <a:schemeClr val="dk1"/>
-              </a:buClr>
-              <a:buSzPts val="1100"/>
-              <a:buFont typeface="Arial"/>
-              <a:buNone/>
-            </a:pPr>
-            <a:r>
-              <a:rPr lang="en"/>
-              <a:t>Otherwise: No grade</a:t>
-            </a:r>
-            <a:endParaRPr/>
-          </a:p>
-          <a:p>
-            <a:pPr indent="0" lvl="0" marL="0" rtl="0" algn="l">
-              <a:spcBef>
-                <a:spcPts val="1200"/>
-              </a:spcBef>
-              <a:spcAft>
-                <a:spcPts val="1200"/>
-              </a:spcAft>
-              <a:buNone/>
-            </a:pPr>
-            <a:r>
-              <a:t/>
+              <a:t>Course Grading</a:t>
             </a:r>
             <a:endParaRPr/>
           </a:p>

</xml_diff>

<commit_message>
Fixes after first session
</commit_message>
<xml_diff>
--- a/Lecture Slides/COACH A01 - Introduction.pptx
+++ b/Lecture Slides/COACH A01 - Introduction.pptx
@@ -7136,11 +7136,11 @@
                 </a:solidFill>
                 <a:hlinkClick r:id="rId3"/>
               </a:rPr>
-              <a:t>https://coach.uni1.de</a:t>
+              <a:t>https://uni1.de/coach/index</a:t>
             </a:r>
             <a:r>
               <a:rPr lang="en"/>
-              <a:t>  </a:t>
+              <a:t> </a:t>
             </a:r>
             <a:endParaRPr/>
           </a:p>
@@ -8594,7 +8594,7 @@
             </a:pPr>
             <a:r>
               <a:rPr lang="en"/>
-              <a:t>Learn to coach agile methods teams</a:t>
+              <a:t>Learn to coach agile teams</a:t>
             </a:r>
             <a:endParaRPr/>
           </a:p>
@@ -9359,7 +9359,7 @@
             <a:tbl>
               <a:tblPr>
                 <a:noFill/>
-                <a:tableStyleId>{FC6A0DF2-C06D-4A33-A880-A92D56615C44}</a:tableStyleId>
+                <a:tableStyleId>{CCA6CEB4-5765-42C4-B45B-978D5D584A35}</a:tableStyleId>
               </a:tblPr>
               <a:tblGrid>
                 <a:gridCol w="1432575"/>
@@ -11242,7 +11242,7 @@
             <a:tbl>
               <a:tblPr>
                 <a:noFill/>
-                <a:tableStyleId>{FC6A0DF2-C06D-4A33-A880-A92D56615C44}</a:tableStyleId>
+                <a:tableStyleId>{CCA6CEB4-5765-42C4-B45B-978D5D584A35}</a:tableStyleId>
               </a:tblPr>
               <a:tblGrid>
                 <a:gridCol w="1432550"/>

</xml_diff>